<commit_message>
factory pattern that doesn't violate the open/close principal added.
</commit_message>
<xml_diff>
--- a/slides/designPatterns.pptx
+++ b/slides/designPatterns.pptx
@@ -6,7 +6,18 @@
   </p:sldMasterIdLst>
   <p:sldIdLst>
     <p:sldId id="256" r:id="rId2"/>
-    <p:sldId id="257" r:id="rId3"/>
+    <p:sldId id="259" r:id="rId3"/>
+    <p:sldId id="260" r:id="rId4"/>
+    <p:sldId id="261" r:id="rId5"/>
+    <p:sldId id="263" r:id="rId6"/>
+    <p:sldId id="266" r:id="rId7"/>
+    <p:sldId id="264" r:id="rId8"/>
+    <p:sldId id="267" r:id="rId9"/>
+    <p:sldId id="262" r:id="rId10"/>
+    <p:sldId id="265" r:id="rId11"/>
+    <p:sldId id="258" r:id="rId12"/>
+    <p:sldId id="257" r:id="rId13"/>
+    <p:sldId id="268" r:id="rId14"/>
   </p:sldIdLst>
   <p:sldSz cx="9144000" cy="6858000" type="screen4x3"/>
   <p:notesSz cx="6858000" cy="9144000"/>
@@ -3115,6 +3126,22 @@
               <a:rPr lang="en-US" dirty="0" smtClean="0"/>
               <a:t>Design Patterns</a:t>
             </a:r>
+            <a:r>
+              <a:rPr lang="ja-JP" altLang="en-US" dirty="0" smtClean="0"/>
+              <a:t> </a:t>
+            </a:r>
+            <a:r>
+              <a:rPr lang="en-US" altLang="ja-JP" dirty="0" smtClean="0"/>
+              <a:t>&amp;</a:t>
+            </a:r>
+            <a:r>
+              <a:rPr lang="ja-JP" altLang="en-US" dirty="0" smtClean="0"/>
+              <a:t> </a:t>
+            </a:r>
+            <a:r>
+              <a:rPr lang="en-US" altLang="ja-JP" dirty="0" smtClean="0"/>
+              <a:t>SOLID!!</a:t>
+            </a:r>
             <a:endParaRPr lang="en-US" dirty="0"/>
           </a:p>
         </p:txBody>
@@ -3134,6 +3161,18 @@
           <a:bodyPr/>
           <a:lstStyle/>
           <a:p>
+            <a:r>
+              <a:rPr lang="en-US" altLang="ja-JP" dirty="0" smtClean="0"/>
+              <a:t>;</a:t>
+            </a:r>
+            <a:r>
+              <a:rPr lang="ja-JP" altLang="en-US" dirty="0" smtClean="0"/>
+              <a:t> </a:t>
+            </a:r>
+            <a:r>
+              <a:rPr lang="en-US" altLang="ja-JP" dirty="0" smtClean="0"/>
+              <a:t>)</a:t>
+            </a:r>
             <a:endParaRPr lang="en-US" dirty="0"/>
           </a:p>
         </p:txBody>
@@ -3148,6 +3187,701 @@
   <p:clrMapOvr>
     <a:masterClrMapping/>
   </p:clrMapOvr>
+  <p:timing>
+    <p:tnLst>
+      <p:par>
+        <p:cTn xmlns:p14="http://schemas.microsoft.com/office/powerpoint/2010/main" id="1" dur="indefinite" restart="never" nodeType="tmRoot"/>
+      </p:par>
+    </p:tnLst>
+  </p:timing>
+</p:sld>
+</file>
+
+<file path=ppt/slides/slide10.xml><?xml version="1.0" encoding="utf-8"?>
+<p:sld xmlns:a="http://schemas.openxmlformats.org/drawingml/2006/main" xmlns:r="http://schemas.openxmlformats.org/officeDocument/2006/relationships" xmlns:p="http://schemas.openxmlformats.org/presentationml/2006/main">
+  <p:cSld>
+    <p:spTree>
+      <p:nvGrpSpPr>
+        <p:cNvPr id="1" name=""/>
+        <p:cNvGrpSpPr/>
+        <p:nvPr/>
+      </p:nvGrpSpPr>
+      <p:grpSpPr>
+        <a:xfrm>
+          <a:off x="0" y="0"/>
+          <a:ext cx="0" cy="0"/>
+          <a:chOff x="0" y="0"/>
+          <a:chExt cx="0" cy="0"/>
+        </a:xfrm>
+      </p:grpSpPr>
+      <p:sp>
+        <p:nvSpPr>
+          <p:cNvPr id="2" name="Title 1"/>
+          <p:cNvSpPr>
+            <a:spLocks noGrp="1"/>
+          </p:cNvSpPr>
+          <p:nvPr>
+            <p:ph type="title"/>
+          </p:nvPr>
+        </p:nvSpPr>
+        <p:spPr/>
+        <p:txBody>
+          <a:bodyPr/>
+          <a:lstStyle/>
+          <a:p>
+            <a:r>
+              <a:rPr lang="en-US" altLang="ja-JP" dirty="0" smtClean="0"/>
+              <a:t>Dependency</a:t>
+            </a:r>
+            <a:r>
+              <a:rPr lang="ja-JP" altLang="en-US" dirty="0" smtClean="0"/>
+              <a:t> </a:t>
+            </a:r>
+            <a:r>
+              <a:rPr lang="en-US" altLang="ja-JP" dirty="0" smtClean="0"/>
+              <a:t>Injection</a:t>
+            </a:r>
+            <a:endParaRPr lang="en-US" dirty="0"/>
+          </a:p>
+        </p:txBody>
+      </p:sp>
+      <p:sp>
+        <p:nvSpPr>
+          <p:cNvPr id="3" name="Content Placeholder 2"/>
+          <p:cNvSpPr>
+            <a:spLocks noGrp="1"/>
+          </p:cNvSpPr>
+          <p:nvPr>
+            <p:ph idx="1"/>
+          </p:nvPr>
+        </p:nvSpPr>
+        <p:spPr/>
+        <p:txBody>
+          <a:bodyPr/>
+          <a:lstStyle/>
+          <a:p>
+            <a:r>
+              <a:rPr lang="en-US" altLang="ja-JP" dirty="0" smtClean="0"/>
+              <a:t>Inject</a:t>
+            </a:r>
+            <a:r>
+              <a:rPr lang="ja-JP" altLang="en-US" dirty="0" smtClean="0"/>
+              <a:t> </a:t>
+            </a:r>
+            <a:r>
+              <a:rPr lang="en-US" altLang="ja-JP" dirty="0" smtClean="0"/>
+              <a:t>the</a:t>
+            </a:r>
+            <a:r>
+              <a:rPr lang="ja-JP" altLang="en-US" dirty="0" smtClean="0"/>
+              <a:t> </a:t>
+            </a:r>
+            <a:r>
+              <a:rPr lang="en-US" altLang="ja-JP" dirty="0" smtClean="0"/>
+              <a:t>dependency</a:t>
+            </a:r>
+            <a:r>
+              <a:rPr lang="ja-JP" altLang="en-US" dirty="0" smtClean="0"/>
+              <a:t> </a:t>
+            </a:r>
+            <a:r>
+              <a:rPr lang="en-US" altLang="ja-JP" dirty="0" smtClean="0"/>
+              <a:t>rather</a:t>
+            </a:r>
+            <a:r>
+              <a:rPr lang="ja-JP" altLang="en-US" dirty="0" smtClean="0"/>
+              <a:t> </a:t>
+            </a:r>
+            <a:r>
+              <a:rPr lang="en-US" altLang="ja-JP" dirty="0" smtClean="0"/>
+              <a:t>than</a:t>
+            </a:r>
+            <a:r>
+              <a:rPr lang="ja-JP" altLang="en-US" dirty="0" smtClean="0"/>
+              <a:t> </a:t>
+            </a:r>
+            <a:r>
+              <a:rPr lang="en-US" altLang="ja-JP" dirty="0" smtClean="0"/>
+              <a:t>allowing</a:t>
+            </a:r>
+            <a:r>
+              <a:rPr lang="ja-JP" altLang="en-US" dirty="0" smtClean="0"/>
+              <a:t> </a:t>
+            </a:r>
+            <a:r>
+              <a:rPr lang="en-US" altLang="ja-JP" dirty="0" err="1" smtClean="0"/>
+              <a:t>concret</a:t>
+            </a:r>
+            <a:r>
+              <a:rPr lang="ja-JP" altLang="en-US" dirty="0" smtClean="0"/>
+              <a:t>e </a:t>
+            </a:r>
+            <a:r>
+              <a:rPr lang="en-US" altLang="ja-JP" dirty="0" smtClean="0"/>
+              <a:t>classed</a:t>
+            </a:r>
+            <a:r>
+              <a:rPr lang="ja-JP" altLang="en-US" dirty="0" smtClean="0"/>
+              <a:t> </a:t>
+            </a:r>
+            <a:r>
+              <a:rPr lang="en-US" altLang="ja-JP" dirty="0" smtClean="0"/>
+              <a:t>to</a:t>
+            </a:r>
+            <a:r>
+              <a:rPr lang="ja-JP" altLang="en-US" dirty="0" smtClean="0"/>
+              <a:t> </a:t>
+            </a:r>
+            <a:r>
+              <a:rPr lang="en-US" altLang="ja-JP" dirty="0" smtClean="0"/>
+              <a:t>be</a:t>
+            </a:r>
+            <a:r>
+              <a:rPr lang="ja-JP" altLang="en-US" dirty="0" smtClean="0"/>
+              <a:t> </a:t>
+            </a:r>
+            <a:r>
+              <a:rPr lang="ja-JP" altLang="ja-JP" dirty="0" smtClean="0"/>
+              <a:t>c</a:t>
+            </a:r>
+            <a:r>
+              <a:rPr lang="en-US" altLang="ja-JP" dirty="0" err="1" smtClean="0"/>
+              <a:t>reated</a:t>
+            </a:r>
+            <a:r>
+              <a:rPr lang="ja-JP" altLang="en-US" dirty="0" smtClean="0"/>
+              <a:t> </a:t>
+            </a:r>
+            <a:r>
+              <a:rPr lang="en-US" altLang="ja-JP" dirty="0" smtClean="0"/>
+              <a:t>in</a:t>
+            </a:r>
+            <a:r>
+              <a:rPr lang="ja-JP" altLang="en-US" dirty="0" smtClean="0"/>
+              <a:t> </a:t>
+            </a:r>
+            <a:r>
+              <a:rPr lang="en-US" altLang="ja-JP" dirty="0" smtClean="0"/>
+              <a:t>code.</a:t>
+            </a:r>
+          </a:p>
+          <a:p>
+            <a:endParaRPr lang="en-US" dirty="0"/>
+          </a:p>
+          <a:p>
+            <a:r>
+              <a:rPr lang="ja-JP" altLang="ja-JP" dirty="0" smtClean="0"/>
+              <a:t>Cr</a:t>
+            </a:r>
+            <a:r>
+              <a:rPr lang="en-US" altLang="ja-JP" dirty="0" err="1" smtClean="0"/>
+              <a:t>eates</a:t>
+            </a:r>
+            <a:r>
+              <a:rPr lang="ja-JP" altLang="en-US" dirty="0" smtClean="0"/>
+              <a:t> </a:t>
+            </a:r>
+            <a:r>
+              <a:rPr lang="en-US" altLang="ja-JP" dirty="0" smtClean="0"/>
+              <a:t>loose</a:t>
+            </a:r>
+            <a:r>
+              <a:rPr lang="ja-JP" altLang="en-US" dirty="0" smtClean="0"/>
+              <a:t> </a:t>
+            </a:r>
+            <a:r>
+              <a:rPr lang="en-US" altLang="ja-JP" dirty="0" smtClean="0"/>
+              <a:t>coupling</a:t>
+            </a:r>
+          </a:p>
+          <a:p>
+            <a:endParaRPr lang="en-US" altLang="ja-JP" dirty="0"/>
+          </a:p>
+          <a:p>
+            <a:r>
+              <a:rPr lang="ja-JP" altLang="ja-JP" dirty="0" smtClean="0"/>
+              <a:t>L</a:t>
+            </a:r>
+            <a:r>
+              <a:rPr lang="en-US" altLang="ja-JP" dirty="0" err="1" smtClean="0"/>
+              <a:t>oose</a:t>
+            </a:r>
+            <a:r>
+              <a:rPr lang="ja-JP" altLang="en-US" dirty="0" smtClean="0"/>
+              <a:t> </a:t>
+            </a:r>
+            <a:r>
+              <a:rPr lang="en-US" altLang="ja-JP" dirty="0" smtClean="0"/>
+              <a:t>coupling</a:t>
+            </a:r>
+            <a:r>
+              <a:rPr lang="ja-JP" altLang="en-US" dirty="0" smtClean="0"/>
+              <a:t> </a:t>
+            </a:r>
+            <a:r>
+              <a:rPr lang="en-US" altLang="ja-JP" dirty="0" smtClean="0"/>
+              <a:t>means</a:t>
+            </a:r>
+            <a:r>
+              <a:rPr lang="ja-JP" altLang="en-US" dirty="0" smtClean="0"/>
+              <a:t> </a:t>
+            </a:r>
+            <a:r>
+              <a:rPr lang="en-US" altLang="ja-JP" dirty="0" smtClean="0"/>
+              <a:t>code</a:t>
+            </a:r>
+            <a:r>
+              <a:rPr lang="ja-JP" altLang="en-US" dirty="0" smtClean="0"/>
+              <a:t> </a:t>
+            </a:r>
+            <a:r>
+              <a:rPr lang="en-US" altLang="ja-JP" dirty="0" smtClean="0"/>
+              <a:t>is</a:t>
+            </a:r>
+            <a:r>
+              <a:rPr lang="ja-JP" altLang="en-US" dirty="0" smtClean="0"/>
+              <a:t> </a:t>
+            </a:r>
+            <a:r>
+              <a:rPr lang="en-US" altLang="ja-JP" dirty="0" smtClean="0"/>
+              <a:t>less</a:t>
+            </a:r>
+            <a:r>
+              <a:rPr lang="ja-JP" altLang="en-US" dirty="0" smtClean="0"/>
+              <a:t> </a:t>
+            </a:r>
+            <a:r>
+              <a:rPr lang="en-US" altLang="ja-JP" dirty="0" smtClean="0"/>
+              <a:t>likely</a:t>
+            </a:r>
+            <a:r>
+              <a:rPr lang="ja-JP" altLang="en-US" dirty="0" smtClean="0"/>
+              <a:t> </a:t>
+            </a:r>
+            <a:r>
+              <a:rPr lang="en-US" altLang="ja-JP" dirty="0" smtClean="0"/>
+              <a:t>to</a:t>
+            </a:r>
+            <a:r>
+              <a:rPr lang="ja-JP" altLang="en-US" dirty="0" smtClean="0"/>
+              <a:t> </a:t>
+            </a:r>
+            <a:r>
+              <a:rPr lang="en-US" altLang="ja-JP" dirty="0" smtClean="0"/>
+              <a:t>break</a:t>
+            </a:r>
+            <a:r>
+              <a:rPr lang="ja-JP" altLang="en-US" dirty="0"/>
+              <a:t>.</a:t>
+            </a:r>
+            <a:endParaRPr lang="en-US" altLang="ja-JP" dirty="0" smtClean="0"/>
+          </a:p>
+          <a:p>
+            <a:endParaRPr lang="en-US" dirty="0"/>
+          </a:p>
+        </p:txBody>
+      </p:sp>
+    </p:spTree>
+    <p:extLst>
+      <p:ext uri="{BB962C8B-B14F-4D97-AF65-F5344CB8AC3E}">
+        <p14:creationId xmlns:p14="http://schemas.microsoft.com/office/powerpoint/2010/main" val="3036543548"/>
+      </p:ext>
+    </p:extLst>
+  </p:cSld>
+  <p:clrMapOvr>
+    <a:masterClrMapping/>
+  </p:clrMapOvr>
+  <p:timing>
+    <p:tnLst>
+      <p:par>
+        <p:cTn xmlns:p14="http://schemas.microsoft.com/office/powerpoint/2010/main" id="1" dur="indefinite" restart="never" nodeType="tmRoot"/>
+      </p:par>
+    </p:tnLst>
+  </p:timing>
+</p:sld>
+</file>
+
+<file path=ppt/slides/slide11.xml><?xml version="1.0" encoding="utf-8"?>
+<p:sld xmlns:a="http://schemas.openxmlformats.org/drawingml/2006/main" xmlns:r="http://schemas.openxmlformats.org/officeDocument/2006/relationships" xmlns:p="http://schemas.openxmlformats.org/presentationml/2006/main">
+  <p:cSld>
+    <p:spTree>
+      <p:nvGrpSpPr>
+        <p:cNvPr id="1" name=""/>
+        <p:cNvGrpSpPr/>
+        <p:nvPr/>
+      </p:nvGrpSpPr>
+      <p:grpSpPr>
+        <a:xfrm>
+          <a:off x="0" y="0"/>
+          <a:ext cx="0" cy="0"/>
+          <a:chOff x="0" y="0"/>
+          <a:chExt cx="0" cy="0"/>
+        </a:xfrm>
+      </p:grpSpPr>
+      <p:sp>
+        <p:nvSpPr>
+          <p:cNvPr id="2" name="Title 1"/>
+          <p:cNvSpPr>
+            <a:spLocks noGrp="1"/>
+          </p:cNvSpPr>
+          <p:nvPr>
+            <p:ph type="title"/>
+          </p:nvPr>
+        </p:nvSpPr>
+        <p:spPr/>
+        <p:txBody>
+          <a:bodyPr/>
+          <a:lstStyle/>
+          <a:p>
+            <a:r>
+              <a:rPr lang="en-US" altLang="ja-JP" dirty="0" smtClean="0"/>
+              <a:t>Creational</a:t>
+            </a:r>
+            <a:r>
+              <a:rPr lang="ja-JP" altLang="en-US" dirty="0" smtClean="0"/>
+              <a:t> </a:t>
+            </a:r>
+            <a:r>
+              <a:rPr lang="en-US" altLang="ja-JP" dirty="0" smtClean="0"/>
+              <a:t>Patterns</a:t>
+            </a:r>
+            <a:endParaRPr lang="en-US" dirty="0"/>
+          </a:p>
+        </p:txBody>
+      </p:sp>
+      <p:sp>
+        <p:nvSpPr>
+          <p:cNvPr id="3" name="Content Placeholder 2"/>
+          <p:cNvSpPr>
+            <a:spLocks noGrp="1"/>
+          </p:cNvSpPr>
+          <p:nvPr>
+            <p:ph idx="1"/>
+          </p:nvPr>
+        </p:nvSpPr>
+        <p:spPr/>
+        <p:txBody>
+          <a:bodyPr/>
+          <a:lstStyle/>
+          <a:p>
+            <a:r>
+              <a:rPr lang="en-US" altLang="ja-JP" dirty="0" smtClean="0"/>
+              <a:t>Singleton</a:t>
+            </a:r>
+          </a:p>
+          <a:p>
+            <a:r>
+              <a:rPr lang="ja-JP" altLang="ja-JP" dirty="0" smtClean="0"/>
+              <a:t>F</a:t>
+            </a:r>
+            <a:r>
+              <a:rPr lang="en-US" altLang="ja-JP" dirty="0" err="1" smtClean="0"/>
+              <a:t>actory</a:t>
+            </a:r>
+            <a:endParaRPr lang="en-US" altLang="ja-JP" dirty="0" smtClean="0"/>
+          </a:p>
+          <a:p>
+            <a:r>
+              <a:rPr lang="en-US" altLang="ja-JP" dirty="0" smtClean="0"/>
+              <a:t>Factory Methods</a:t>
+            </a:r>
+          </a:p>
+          <a:p>
+            <a:r>
+              <a:rPr lang="en-US" altLang="ja-JP" dirty="0" smtClean="0"/>
+              <a:t>Abstract Factory</a:t>
+            </a:r>
+          </a:p>
+          <a:p>
+            <a:r>
+              <a:rPr lang="en-US" altLang="ja-JP" dirty="0" smtClean="0"/>
+              <a:t>Builder</a:t>
+            </a:r>
+          </a:p>
+          <a:p>
+            <a:r>
+              <a:rPr lang="en-US" altLang="ja-JP" dirty="0" smtClean="0"/>
+              <a:t>Prototype</a:t>
+            </a:r>
+          </a:p>
+        </p:txBody>
+      </p:sp>
+    </p:spTree>
+    <p:extLst>
+      <p:ext uri="{BB962C8B-B14F-4D97-AF65-F5344CB8AC3E}">
+        <p14:creationId xmlns:p14="http://schemas.microsoft.com/office/powerpoint/2010/main" val="3876259985"/>
+      </p:ext>
+    </p:extLst>
+  </p:cSld>
+  <p:clrMapOvr>
+    <a:masterClrMapping/>
+  </p:clrMapOvr>
+  <p:timing>
+    <p:tnLst>
+      <p:par>
+        <p:cTn xmlns:p14="http://schemas.microsoft.com/office/powerpoint/2010/main" id="1" dur="indefinite" restart="never" nodeType="tmRoot"/>
+      </p:par>
+    </p:tnLst>
+  </p:timing>
+</p:sld>
+</file>
+
+<file path=ppt/slides/slide12.xml><?xml version="1.0" encoding="utf-8"?>
+<p:sld xmlns:a="http://schemas.openxmlformats.org/drawingml/2006/main" xmlns:r="http://schemas.openxmlformats.org/officeDocument/2006/relationships" xmlns:p="http://schemas.openxmlformats.org/presentationml/2006/main">
+  <p:cSld>
+    <p:spTree>
+      <p:nvGrpSpPr>
+        <p:cNvPr id="1" name=""/>
+        <p:cNvGrpSpPr/>
+        <p:nvPr/>
+      </p:nvGrpSpPr>
+      <p:grpSpPr>
+        <a:xfrm>
+          <a:off x="0" y="0"/>
+          <a:ext cx="0" cy="0"/>
+          <a:chOff x="0" y="0"/>
+          <a:chExt cx="0" cy="0"/>
+        </a:xfrm>
+      </p:grpSpPr>
+      <p:sp>
+        <p:nvSpPr>
+          <p:cNvPr id="2" name="Title 1"/>
+          <p:cNvSpPr>
+            <a:spLocks noGrp="1"/>
+          </p:cNvSpPr>
+          <p:nvPr>
+            <p:ph type="title"/>
+          </p:nvPr>
+        </p:nvSpPr>
+        <p:spPr/>
+        <p:txBody>
+          <a:bodyPr/>
+          <a:lstStyle/>
+          <a:p>
+            <a:r>
+              <a:rPr lang="en-US" dirty="0" smtClean="0"/>
+              <a:t>Singleton</a:t>
+            </a:r>
+            <a:endParaRPr lang="en-US" dirty="0"/>
+          </a:p>
+        </p:txBody>
+      </p:sp>
+      <p:sp>
+        <p:nvSpPr>
+          <p:cNvPr id="3" name="Content Placeholder 2"/>
+          <p:cNvSpPr>
+            <a:spLocks noGrp="1"/>
+          </p:cNvSpPr>
+          <p:nvPr>
+            <p:ph idx="1"/>
+          </p:nvPr>
+        </p:nvSpPr>
+        <p:spPr>
+          <a:xfrm>
+            <a:off x="457200" y="1270052"/>
+            <a:ext cx="8229600" cy="4942909"/>
+          </a:xfrm>
+        </p:spPr>
+        <p:txBody>
+          <a:bodyPr>
+            <a:normAutofit/>
+          </a:bodyPr>
+          <a:lstStyle/>
+          <a:p>
+            <a:pPr>
+              <a:spcBef>
+                <a:spcPts val="0"/>
+              </a:spcBef>
+            </a:pPr>
+            <a:r>
+              <a:rPr lang="en-US" sz="2400" dirty="0" smtClean="0"/>
+              <a:t>Singleton allows you to enforce that only one instance exists. </a:t>
+            </a:r>
+          </a:p>
+          <a:p>
+            <a:pPr>
+              <a:spcBef>
+                <a:spcPts val="0"/>
+              </a:spcBef>
+            </a:pPr>
+            <a:endParaRPr lang="en-US" sz="2400" dirty="0" smtClean="0"/>
+          </a:p>
+          <a:p>
+            <a:pPr>
+              <a:spcBef>
+                <a:spcPts val="0"/>
+              </a:spcBef>
+            </a:pPr>
+            <a:r>
+              <a:rPr lang="en-US" sz="2400" dirty="0" smtClean="0"/>
+              <a:t>The constructor must not be accessible from outside of the class.</a:t>
+            </a:r>
+          </a:p>
+          <a:p>
+            <a:endParaRPr lang="en-US" sz="2400" dirty="0"/>
+          </a:p>
+          <a:p>
+            <a:r>
+              <a:rPr lang="en-US" sz="2400" dirty="0" smtClean="0"/>
+              <a:t>Private constructor will prevent the class to be instantiated from the outside. </a:t>
+            </a:r>
+            <a:r>
+              <a:rPr lang="en-US" sz="2400" dirty="0" smtClean="0"/>
+              <a:t>The class is responsible for managing it’s own creation by using a static method.</a:t>
+            </a:r>
+            <a:endParaRPr lang="en-US" sz="2400" dirty="0" smtClean="0"/>
+          </a:p>
+          <a:p>
+            <a:endParaRPr lang="en-US" sz="2400" dirty="0" smtClean="0"/>
+          </a:p>
+          <a:p>
+            <a:r>
+              <a:rPr lang="en-US" sz="2400" dirty="0" smtClean="0"/>
+              <a:t>Useful scenarios: loggers, </a:t>
+            </a:r>
+            <a:r>
+              <a:rPr lang="en-US" sz="2400" dirty="0" err="1" smtClean="0"/>
+              <a:t>config</a:t>
+            </a:r>
+            <a:r>
+              <a:rPr lang="en-US" sz="2400" dirty="0" smtClean="0"/>
+              <a:t> classes</a:t>
+            </a:r>
+          </a:p>
+          <a:p>
+            <a:endParaRPr lang="en-US" dirty="0" smtClean="0"/>
+          </a:p>
+          <a:p>
+            <a:endParaRPr lang="en-US" dirty="0"/>
+          </a:p>
+        </p:txBody>
+      </p:sp>
+    </p:spTree>
+    <p:extLst>
+      <p:ext uri="{BB962C8B-B14F-4D97-AF65-F5344CB8AC3E}">
+        <p14:creationId xmlns:p14="http://schemas.microsoft.com/office/powerpoint/2010/main" val="3322217198"/>
+      </p:ext>
+    </p:extLst>
+  </p:cSld>
+  <p:clrMapOvr>
+    <a:masterClrMapping/>
+  </p:clrMapOvr>
+  <p:timing>
+    <p:tnLst>
+      <p:par>
+        <p:cTn xmlns:p14="http://schemas.microsoft.com/office/powerpoint/2010/main" id="1" dur="indefinite" restart="never" nodeType="tmRoot"/>
+      </p:par>
+    </p:tnLst>
+  </p:timing>
+</p:sld>
+</file>
+
+<file path=ppt/slides/slide13.xml><?xml version="1.0" encoding="utf-8"?>
+<p:sld xmlns:a="http://schemas.openxmlformats.org/drawingml/2006/main" xmlns:r="http://schemas.openxmlformats.org/officeDocument/2006/relationships" xmlns:p="http://schemas.openxmlformats.org/presentationml/2006/main">
+  <p:cSld>
+    <p:spTree>
+      <p:nvGrpSpPr>
+        <p:cNvPr id="1" name=""/>
+        <p:cNvGrpSpPr/>
+        <p:nvPr/>
+      </p:nvGrpSpPr>
+      <p:grpSpPr>
+        <a:xfrm>
+          <a:off x="0" y="0"/>
+          <a:ext cx="0" cy="0"/>
+          <a:chOff x="0" y="0"/>
+          <a:chExt cx="0" cy="0"/>
+        </a:xfrm>
+      </p:grpSpPr>
+      <p:sp>
+        <p:nvSpPr>
+          <p:cNvPr id="2" name="Title 1"/>
+          <p:cNvSpPr>
+            <a:spLocks noGrp="1"/>
+          </p:cNvSpPr>
+          <p:nvPr>
+            <p:ph type="title"/>
+          </p:nvPr>
+        </p:nvSpPr>
+        <p:spPr/>
+        <p:txBody>
+          <a:bodyPr/>
+          <a:lstStyle/>
+          <a:p>
+            <a:r>
+              <a:rPr lang="en-US" altLang="ja-JP" dirty="0" smtClean="0"/>
+              <a:t>Factory</a:t>
+            </a:r>
+            <a:r>
+              <a:rPr lang="ja-JP" altLang="en-US" dirty="0" smtClean="0"/>
+              <a:t> </a:t>
+            </a:r>
+            <a:r>
+              <a:rPr lang="en-US" altLang="ja-JP" dirty="0" smtClean="0"/>
+              <a:t>Pattern!</a:t>
+            </a:r>
+            <a:endParaRPr lang="en-US" dirty="0"/>
+          </a:p>
+        </p:txBody>
+      </p:sp>
+      <p:sp>
+        <p:nvSpPr>
+          <p:cNvPr id="3" name="Content Placeholder 2"/>
+          <p:cNvSpPr>
+            <a:spLocks noGrp="1"/>
+          </p:cNvSpPr>
+          <p:nvPr>
+            <p:ph idx="1"/>
+          </p:nvPr>
+        </p:nvSpPr>
+        <p:spPr/>
+        <p:txBody>
+          <a:bodyPr/>
+          <a:lstStyle/>
+          <a:p>
+            <a:r>
+              <a:rPr lang="en-US" dirty="0" smtClean="0"/>
+              <a:t>Usually a singleton!</a:t>
+            </a:r>
+          </a:p>
+          <a:p>
+            <a:endParaRPr lang="en-US" dirty="0"/>
+          </a:p>
+          <a:p>
+            <a:r>
+              <a:rPr lang="en-US" dirty="0" smtClean="0"/>
+              <a:t>Creates the object without user having to be concerned with the logic of how it has to be instantiated.</a:t>
+            </a:r>
+          </a:p>
+          <a:p>
+            <a:endParaRPr lang="en-US" dirty="0"/>
+          </a:p>
+          <a:p>
+            <a:r>
+              <a:rPr lang="en-US" dirty="0" smtClean="0"/>
+              <a:t>Refers to the newly created object through a common interface!</a:t>
+            </a:r>
+            <a:endParaRPr lang="en-US" dirty="0"/>
+          </a:p>
+        </p:txBody>
+      </p:sp>
+    </p:spTree>
+    <p:extLst>
+      <p:ext uri="{BB962C8B-B14F-4D97-AF65-F5344CB8AC3E}">
+        <p14:creationId xmlns:p14="http://schemas.microsoft.com/office/powerpoint/2010/main" val="136424565"/>
+      </p:ext>
+    </p:extLst>
+  </p:cSld>
+  <p:clrMapOvr>
+    <a:masterClrMapping/>
+  </p:clrMapOvr>
+  <p:timing>
+    <p:tnLst>
+      <p:par>
+        <p:cTn xmlns:p14="http://schemas.microsoft.com/office/powerpoint/2010/main" id="1" dur="indefinite" restart="never" nodeType="tmRoot"/>
+      </p:par>
+    </p:tnLst>
+  </p:timing>
 </p:sld>
 </file>
 
@@ -3184,113 +3918,2397 @@
           <a:lstStyle/>
           <a:p>
             <a:r>
+              <a:rPr lang="en-US" altLang="ja-JP" dirty="0" smtClean="0"/>
+              <a:t>SOLID</a:t>
+            </a:r>
+            <a:endParaRPr lang="en-US" dirty="0"/>
+          </a:p>
+        </p:txBody>
+      </p:sp>
+      <p:sp>
+        <p:nvSpPr>
+          <p:cNvPr id="3" name="Content Placeholder 2"/>
+          <p:cNvSpPr>
+            <a:spLocks noGrp="1"/>
+          </p:cNvSpPr>
+          <p:nvPr>
+            <p:ph idx="1"/>
+          </p:nvPr>
+        </p:nvSpPr>
+        <p:spPr/>
+        <p:txBody>
+          <a:bodyPr>
+            <a:normAutofit fontScale="92500" lnSpcReduction="20000"/>
+          </a:bodyPr>
+          <a:lstStyle/>
+          <a:p>
+            <a:r>
+              <a:rPr lang="en-US" altLang="ja-JP" dirty="0" smtClean="0"/>
+              <a:t>Single</a:t>
+            </a:r>
+            <a:r>
+              <a:rPr lang="ja-JP" altLang="en-US" dirty="0" smtClean="0"/>
+              <a:t> </a:t>
+            </a:r>
+            <a:r>
+              <a:rPr lang="en-US" altLang="ja-JP" dirty="0" smtClean="0"/>
+              <a:t>responsibility</a:t>
+            </a:r>
+            <a:r>
+              <a:rPr lang="ja-JP" altLang="en-US" dirty="0" smtClean="0"/>
+              <a:t> </a:t>
+            </a:r>
+            <a:r>
+              <a:rPr lang="en-US" altLang="ja-JP" dirty="0" smtClean="0"/>
+              <a:t>principal</a:t>
+            </a:r>
+          </a:p>
+          <a:p>
+            <a:r>
               <a:rPr lang="en-US" dirty="0" smtClean="0"/>
-              <a:t>Singleton</a:t>
-            </a:r>
-            <a:endParaRPr lang="en-US" dirty="0"/>
-          </a:p>
-        </p:txBody>
-      </p:sp>
-      <p:sp>
-        <p:nvSpPr>
-          <p:cNvPr id="3" name="Content Placeholder 2"/>
-          <p:cNvSpPr>
-            <a:spLocks noGrp="1"/>
-          </p:cNvSpPr>
-          <p:nvPr>
-            <p:ph idx="1"/>
-          </p:nvPr>
-        </p:nvSpPr>
-        <p:spPr>
-          <a:xfrm>
-            <a:off x="457200" y="1270052"/>
-            <a:ext cx="8229600" cy="4942909"/>
-          </a:xfrm>
-        </p:spPr>
-        <p:txBody>
-          <a:bodyPr>
-            <a:normAutofit/>
-          </a:bodyPr>
-          <a:lstStyle/>
-          <a:p>
-            <a:pPr>
-              <a:spcBef>
-                <a:spcPts val="0"/>
-              </a:spcBef>
+              <a:t>Open/Closed principal</a:t>
+            </a:r>
+          </a:p>
+          <a:p>
+            <a:r>
+              <a:rPr lang="en-US" dirty="0" err="1" smtClean="0"/>
+              <a:t>Liskov</a:t>
+            </a:r>
+            <a:r>
+              <a:rPr lang="en-US" dirty="0" err="1" smtClean="0"/>
+              <a:t>’</a:t>
+            </a:r>
+            <a:r>
+              <a:rPr lang="en-US" dirty="0" err="1" smtClean="0"/>
+              <a:t>s</a:t>
+            </a:r>
+            <a:r>
+              <a:rPr lang="en-US" dirty="0" smtClean="0"/>
+              <a:t> substitution principal</a:t>
+            </a:r>
+            <a:endParaRPr lang="en-US" dirty="0" smtClean="0"/>
+          </a:p>
+          <a:p>
+            <a:r>
+              <a:rPr lang="en-US" dirty="0" smtClean="0"/>
+              <a:t>Interface segregation principal</a:t>
+            </a:r>
+          </a:p>
+          <a:p>
+            <a:r>
+              <a:rPr lang="en-US" dirty="0" smtClean="0"/>
+              <a:t>Dependency inversion principal</a:t>
+            </a:r>
+          </a:p>
+          <a:p>
+            <a:pPr marL="0" indent="0">
+              <a:buNone/>
             </a:pPr>
-            <a:r>
-              <a:rPr lang="en-US" sz="2400" dirty="0" smtClean="0"/>
-              <a:t>Singleton allows you to enforce that only one instance exists. </a:t>
-            </a:r>
-          </a:p>
-          <a:p>
-            <a:pPr>
-              <a:spcBef>
-                <a:spcPts val="0"/>
-              </a:spcBef>
+            <a:endParaRPr lang="en-US" dirty="0" smtClean="0"/>
+          </a:p>
+          <a:p>
+            <a:pPr marL="0" indent="0">
+              <a:buNone/>
             </a:pPr>
-            <a:endParaRPr lang="en-US" sz="2400" dirty="0" smtClean="0"/>
-          </a:p>
-          <a:p>
-            <a:pPr>
-              <a:spcBef>
-                <a:spcPts val="0"/>
-              </a:spcBef>
+            <a:r>
+              <a:rPr lang="en-US" altLang="ja-JP" sz="1900" dirty="0" smtClean="0">
+                <a:solidFill>
+                  <a:schemeClr val="accent4">
+                    <a:lumMod val="75000"/>
+                  </a:schemeClr>
+                </a:solidFill>
+              </a:rPr>
+              <a:t>Motivation?</a:t>
+            </a:r>
+            <a:endParaRPr lang="en-US" altLang="ja-JP" sz="1900" dirty="0" smtClean="0">
+              <a:solidFill>
+                <a:schemeClr val="accent4">
+                  <a:lumMod val="75000"/>
+                </a:schemeClr>
+              </a:solidFill>
+            </a:endParaRPr>
+          </a:p>
+          <a:p>
+            <a:pPr marL="0" indent="0">
+              <a:buNone/>
             </a:pPr>
             <a:r>
-              <a:rPr lang="en-US" sz="2400" dirty="0" smtClean="0"/>
-              <a:t>The constructor must not be accessible from outside of the class.</a:t>
-            </a:r>
-          </a:p>
-          <a:p>
-            <a:endParaRPr lang="en-US" sz="2400" dirty="0"/>
-          </a:p>
-          <a:p>
-            <a:r>
-              <a:rPr lang="en-US" sz="2400" dirty="0" smtClean="0"/>
-              <a:t>Private constructor will prevent the class to be instantiated from the outside. </a:t>
-            </a:r>
-            <a:r>
-              <a:rPr lang="en-US" sz="2400" dirty="0" smtClean="0"/>
-              <a:t>The class is responsible for managing it’s own creation by using a static method.</a:t>
-            </a:r>
-            <a:endParaRPr lang="en-US" sz="2400" dirty="0" smtClean="0"/>
-          </a:p>
-          <a:p>
-            <a:endParaRPr lang="en-US" sz="2400" dirty="0" smtClean="0"/>
-          </a:p>
-          <a:p>
-            <a:r>
-              <a:rPr lang="en-US" sz="2400" dirty="0" smtClean="0"/>
-              <a:t>Useful scenarios: loggers, </a:t>
-            </a:r>
-            <a:r>
-              <a:rPr lang="en-US" sz="2400" dirty="0" err="1" smtClean="0"/>
-              <a:t>config</a:t>
-            </a:r>
-            <a:r>
-              <a:rPr lang="en-US" sz="2400" dirty="0" smtClean="0"/>
-              <a:t> classes</a:t>
-            </a:r>
-          </a:p>
-          <a:p>
-            <a:endParaRPr lang="en-US" dirty="0" smtClean="0"/>
-          </a:p>
-          <a:p>
-            <a:endParaRPr lang="en-US" dirty="0"/>
+              <a:rPr lang="ja-JP" altLang="en-US" sz="1900" dirty="0" smtClean="0">
+                <a:solidFill>
+                  <a:schemeClr val="accent4">
+                    <a:lumMod val="75000"/>
+                  </a:schemeClr>
+                </a:solidFill>
+              </a:rPr>
+              <a:t>*</a:t>
+            </a:r>
+            <a:r>
+              <a:rPr lang="ja-JP" altLang="ja-JP" sz="1900" dirty="0" smtClean="0">
+                <a:solidFill>
+                  <a:schemeClr val="accent4">
+                    <a:lumMod val="75000"/>
+                  </a:schemeClr>
+                </a:solidFill>
+              </a:rPr>
+              <a:t>A</a:t>
+            </a:r>
+            <a:r>
+              <a:rPr lang="en-US" altLang="ja-JP" sz="1900" dirty="0" smtClean="0">
+                <a:solidFill>
+                  <a:schemeClr val="accent4">
+                    <a:lumMod val="75000"/>
+                  </a:schemeClr>
+                </a:solidFill>
+              </a:rPr>
+              <a:t>voids</a:t>
+            </a:r>
+            <a:r>
+              <a:rPr lang="ja-JP" altLang="en-US" sz="1900" dirty="0" smtClean="0">
+                <a:solidFill>
+                  <a:schemeClr val="accent4">
+                    <a:lumMod val="75000"/>
+                  </a:schemeClr>
+                </a:solidFill>
+              </a:rPr>
+              <a:t> </a:t>
+            </a:r>
+            <a:r>
+              <a:rPr lang="en-US" altLang="ja-JP" sz="1900" dirty="0" smtClean="0">
+                <a:solidFill>
+                  <a:schemeClr val="accent4">
+                    <a:lumMod val="75000"/>
+                  </a:schemeClr>
+                </a:solidFill>
+              </a:rPr>
+              <a:t>unnecessary</a:t>
+            </a:r>
+            <a:r>
+              <a:rPr lang="ja-JP" altLang="en-US" sz="1900" dirty="0" smtClean="0">
+                <a:solidFill>
+                  <a:schemeClr val="accent4">
+                    <a:lumMod val="75000"/>
+                  </a:schemeClr>
+                </a:solidFill>
+              </a:rPr>
+              <a:t> </a:t>
+            </a:r>
+            <a:r>
+              <a:rPr lang="en-US" altLang="ja-JP" sz="1900" dirty="0" smtClean="0">
+                <a:solidFill>
+                  <a:schemeClr val="accent4">
+                    <a:lumMod val="75000"/>
+                  </a:schemeClr>
+                </a:solidFill>
+              </a:rPr>
+              <a:t>unit</a:t>
+            </a:r>
+            <a:r>
+              <a:rPr lang="ja-JP" altLang="en-US" sz="1900" dirty="0" smtClean="0">
+                <a:solidFill>
+                  <a:schemeClr val="accent4">
+                    <a:lumMod val="75000"/>
+                  </a:schemeClr>
+                </a:solidFill>
+              </a:rPr>
+              <a:t> </a:t>
+            </a:r>
+            <a:r>
+              <a:rPr lang="en-US" altLang="ja-JP" sz="1900" dirty="0" smtClean="0">
+                <a:solidFill>
+                  <a:schemeClr val="accent4">
+                    <a:lumMod val="75000"/>
+                  </a:schemeClr>
+                </a:solidFill>
+              </a:rPr>
+              <a:t>testing</a:t>
+            </a:r>
+            <a:r>
+              <a:rPr lang="ja-JP" altLang="en-US" sz="1900" dirty="0" smtClean="0">
+                <a:solidFill>
+                  <a:schemeClr val="accent4">
+                    <a:lumMod val="75000"/>
+                  </a:schemeClr>
+                </a:solidFill>
+              </a:rPr>
+              <a:t> </a:t>
+            </a:r>
+            <a:endParaRPr lang="en-US" altLang="ja-JP" sz="1900" dirty="0" smtClean="0">
+              <a:solidFill>
+                <a:schemeClr val="accent4">
+                  <a:lumMod val="75000"/>
+                </a:schemeClr>
+              </a:solidFill>
+            </a:endParaRPr>
+          </a:p>
+          <a:p>
+            <a:pPr marL="0" indent="0">
+              <a:buNone/>
+            </a:pPr>
+            <a:r>
+              <a:rPr lang="ja-JP" altLang="ja-JP" sz="1900" dirty="0" smtClean="0">
+                <a:solidFill>
+                  <a:schemeClr val="accent4">
+                    <a:lumMod val="75000"/>
+                  </a:schemeClr>
+                </a:solidFill>
+              </a:rPr>
+              <a:t>*</a:t>
+            </a:r>
+            <a:r>
+              <a:rPr lang="en-US" altLang="ja-JP" sz="1900" dirty="0" smtClean="0">
+                <a:solidFill>
+                  <a:schemeClr val="accent4">
+                    <a:lumMod val="75000"/>
+                  </a:schemeClr>
+                </a:solidFill>
+              </a:rPr>
+              <a:t>Avoids wasted time trying to understand high-level</a:t>
+            </a:r>
+            <a:r>
+              <a:rPr lang="ja-JP" altLang="en-US" sz="1900" dirty="0" smtClean="0">
+                <a:solidFill>
+                  <a:schemeClr val="accent4">
+                    <a:lumMod val="75000"/>
+                  </a:schemeClr>
+                </a:solidFill>
+              </a:rPr>
+              <a:t> </a:t>
+            </a:r>
+            <a:r>
+              <a:rPr lang="en-US" altLang="ja-JP" sz="1900" dirty="0" smtClean="0">
+                <a:solidFill>
+                  <a:schemeClr val="accent4">
+                    <a:lumMod val="75000"/>
+                  </a:schemeClr>
+                </a:solidFill>
+              </a:rPr>
+              <a:t>code</a:t>
+            </a:r>
+          </a:p>
+          <a:p>
+            <a:pPr marL="0" indent="0">
+              <a:buNone/>
+            </a:pPr>
+            <a:r>
+              <a:rPr lang="en-US" altLang="ja-JP" sz="1900" dirty="0" smtClean="0">
+                <a:solidFill>
+                  <a:schemeClr val="accent4">
+                    <a:lumMod val="75000"/>
+                  </a:schemeClr>
+                </a:solidFill>
+              </a:rPr>
+              <a:t>*Avoids unnecessary maintenance time</a:t>
+            </a:r>
+          </a:p>
+          <a:p>
+            <a:pPr marL="0" indent="0">
+              <a:buNone/>
+            </a:pPr>
+            <a:r>
+              <a:rPr lang="en-US" altLang="ja-JP" sz="1900" dirty="0" smtClean="0">
+                <a:solidFill>
+                  <a:schemeClr val="accent4">
+                    <a:lumMod val="75000"/>
+                  </a:schemeClr>
+                </a:solidFill>
+              </a:rPr>
+              <a:t>*Clean maintainable code!</a:t>
+            </a:r>
+          </a:p>
+          <a:p>
+            <a:pPr marL="0" indent="0">
+              <a:buNone/>
+            </a:pPr>
+            <a:r>
+              <a:rPr lang="ja-JP" altLang="ja-JP" sz="1900" dirty="0" smtClean="0">
+                <a:solidFill>
+                  <a:schemeClr val="accent4">
+                    <a:lumMod val="75000"/>
+                  </a:schemeClr>
+                </a:solidFill>
+              </a:rPr>
+              <a:t>*</a:t>
+            </a:r>
+            <a:r>
+              <a:rPr lang="en-US" altLang="ja-JP" sz="1900" dirty="0" smtClean="0">
+                <a:solidFill>
+                  <a:schemeClr val="accent4">
+                    <a:lumMod val="75000"/>
+                  </a:schemeClr>
+                </a:solidFill>
+              </a:rPr>
+              <a:t>Loose</a:t>
+            </a:r>
+            <a:r>
+              <a:rPr lang="ja-JP" altLang="en-US" sz="1900" dirty="0" smtClean="0">
+                <a:solidFill>
+                  <a:schemeClr val="accent4">
+                    <a:lumMod val="75000"/>
+                  </a:schemeClr>
+                </a:solidFill>
+              </a:rPr>
+              <a:t> </a:t>
+            </a:r>
+            <a:r>
+              <a:rPr lang="en-US" altLang="ja-JP" sz="1900" dirty="0" smtClean="0">
+                <a:solidFill>
+                  <a:schemeClr val="accent4">
+                    <a:lumMod val="75000"/>
+                  </a:schemeClr>
+                </a:solidFill>
+              </a:rPr>
+              <a:t>coupling</a:t>
+            </a:r>
+            <a:r>
+              <a:rPr lang="ja-JP" altLang="en-US" sz="1900" dirty="0">
+                <a:solidFill>
+                  <a:schemeClr val="accent4">
+                    <a:lumMod val="75000"/>
+                  </a:schemeClr>
+                </a:solidFill>
+              </a:rPr>
+              <a:t>!</a:t>
+            </a:r>
+            <a:endParaRPr lang="en-US" sz="1900" dirty="0">
+              <a:solidFill>
+                <a:schemeClr val="accent4">
+                  <a:lumMod val="75000"/>
+                </a:schemeClr>
+              </a:solidFill>
+            </a:endParaRPr>
           </a:p>
         </p:txBody>
       </p:sp>
     </p:spTree>
     <p:extLst>
       <p:ext uri="{BB962C8B-B14F-4D97-AF65-F5344CB8AC3E}">
-        <p14:creationId xmlns:p14="http://schemas.microsoft.com/office/powerpoint/2010/main" val="3322217198"/>
+        <p14:creationId xmlns:p14="http://schemas.microsoft.com/office/powerpoint/2010/main" val="1421436676"/>
       </p:ext>
     </p:extLst>
   </p:cSld>
   <p:clrMapOvr>
     <a:masterClrMapping/>
   </p:clrMapOvr>
+  <p:timing>
+    <p:tnLst>
+      <p:par>
+        <p:cTn xmlns:p14="http://schemas.microsoft.com/office/powerpoint/2010/main" id="1" dur="indefinite" restart="never" nodeType="tmRoot"/>
+      </p:par>
+    </p:tnLst>
+  </p:timing>
+</p:sld>
+</file>
+
+<file path=ppt/slides/slide3.xml><?xml version="1.0" encoding="utf-8"?>
+<p:sld xmlns:a="http://schemas.openxmlformats.org/drawingml/2006/main" xmlns:r="http://schemas.openxmlformats.org/officeDocument/2006/relationships" xmlns:p="http://schemas.openxmlformats.org/presentationml/2006/main">
+  <p:cSld>
+    <p:spTree>
+      <p:nvGrpSpPr>
+        <p:cNvPr id="1" name=""/>
+        <p:cNvGrpSpPr/>
+        <p:nvPr/>
+      </p:nvGrpSpPr>
+      <p:grpSpPr>
+        <a:xfrm>
+          <a:off x="0" y="0"/>
+          <a:ext cx="0" cy="0"/>
+          <a:chOff x="0" y="0"/>
+          <a:chExt cx="0" cy="0"/>
+        </a:xfrm>
+      </p:grpSpPr>
+      <p:sp>
+        <p:nvSpPr>
+          <p:cNvPr id="2" name="Title 1"/>
+          <p:cNvSpPr>
+            <a:spLocks noGrp="1"/>
+          </p:cNvSpPr>
+          <p:nvPr>
+            <p:ph type="title"/>
+          </p:nvPr>
+        </p:nvSpPr>
+        <p:spPr/>
+        <p:txBody>
+          <a:bodyPr/>
+          <a:lstStyle/>
+          <a:p>
+            <a:r>
+              <a:rPr lang="en-US" altLang="ja-JP" dirty="0" smtClean="0"/>
+              <a:t>Single</a:t>
+            </a:r>
+            <a:r>
+              <a:rPr lang="ja-JP" altLang="en-US" dirty="0" smtClean="0"/>
+              <a:t> </a:t>
+            </a:r>
+            <a:r>
+              <a:rPr lang="en-US" altLang="ja-JP" dirty="0"/>
+              <a:t>R</a:t>
+            </a:r>
+            <a:r>
+              <a:rPr lang="en-US" altLang="ja-JP" dirty="0" smtClean="0"/>
+              <a:t>esponsibility</a:t>
+            </a:r>
+            <a:r>
+              <a:rPr lang="ja-JP" altLang="en-US" dirty="0" smtClean="0"/>
+              <a:t> </a:t>
+            </a:r>
+            <a:endParaRPr lang="en-US" dirty="0"/>
+          </a:p>
+        </p:txBody>
+      </p:sp>
+      <p:sp>
+        <p:nvSpPr>
+          <p:cNvPr id="3" name="Content Placeholder 2"/>
+          <p:cNvSpPr>
+            <a:spLocks noGrp="1"/>
+          </p:cNvSpPr>
+          <p:nvPr>
+            <p:ph idx="1"/>
+          </p:nvPr>
+        </p:nvSpPr>
+        <p:spPr/>
+        <p:txBody>
+          <a:bodyPr>
+            <a:normAutofit lnSpcReduction="10000"/>
+          </a:bodyPr>
+          <a:lstStyle/>
+          <a:p>
+            <a:r>
+              <a:rPr lang="en-US" dirty="0" smtClean="0"/>
+              <a:t>A class should only have one reason to change.</a:t>
+            </a:r>
+          </a:p>
+          <a:p>
+            <a:endParaRPr lang="en-US" dirty="0" smtClean="0"/>
+          </a:p>
+          <a:p>
+            <a:r>
+              <a:rPr lang="en-US" dirty="0" smtClean="0"/>
+              <a:t>Get rid of bloated classes!</a:t>
+            </a:r>
+          </a:p>
+          <a:p>
+            <a:endParaRPr lang="en-US" dirty="0"/>
+          </a:p>
+          <a:p>
+            <a:r>
+              <a:rPr lang="en-US" dirty="0" smtClean="0"/>
+              <a:t>Identify the use-case for the class and abstract out a new class to handle responsibility. Forward thinking of how the class if going to evolve is needed. </a:t>
+            </a:r>
+            <a:endParaRPr lang="en-US" dirty="0"/>
+          </a:p>
+        </p:txBody>
+      </p:sp>
+    </p:spTree>
+    <p:extLst>
+      <p:ext uri="{BB962C8B-B14F-4D97-AF65-F5344CB8AC3E}">
+        <p14:creationId xmlns:p14="http://schemas.microsoft.com/office/powerpoint/2010/main" val="3211351185"/>
+      </p:ext>
+    </p:extLst>
+  </p:cSld>
+  <p:clrMapOvr>
+    <a:masterClrMapping/>
+  </p:clrMapOvr>
+  <p:timing>
+    <p:tnLst>
+      <p:par>
+        <p:cTn xmlns:p14="http://schemas.microsoft.com/office/powerpoint/2010/main" id="1" dur="indefinite" restart="never" nodeType="tmRoot"/>
+      </p:par>
+    </p:tnLst>
+  </p:timing>
+</p:sld>
+</file>
+
+<file path=ppt/slides/slide4.xml><?xml version="1.0" encoding="utf-8"?>
+<p:sld xmlns:a="http://schemas.openxmlformats.org/drawingml/2006/main" xmlns:r="http://schemas.openxmlformats.org/officeDocument/2006/relationships" xmlns:p="http://schemas.openxmlformats.org/presentationml/2006/main">
+  <p:cSld>
+    <p:spTree>
+      <p:nvGrpSpPr>
+        <p:cNvPr id="1" name=""/>
+        <p:cNvGrpSpPr/>
+        <p:nvPr/>
+      </p:nvGrpSpPr>
+      <p:grpSpPr>
+        <a:xfrm>
+          <a:off x="0" y="0"/>
+          <a:ext cx="0" cy="0"/>
+          <a:chOff x="0" y="0"/>
+          <a:chExt cx="0" cy="0"/>
+        </a:xfrm>
+      </p:grpSpPr>
+      <p:sp>
+        <p:nvSpPr>
+          <p:cNvPr id="2" name="Title 1"/>
+          <p:cNvSpPr>
+            <a:spLocks noGrp="1"/>
+          </p:cNvSpPr>
+          <p:nvPr>
+            <p:ph type="title"/>
+          </p:nvPr>
+        </p:nvSpPr>
+        <p:spPr/>
+        <p:txBody>
+          <a:bodyPr/>
+          <a:lstStyle/>
+          <a:p>
+            <a:r>
+              <a:rPr lang="en-US" altLang="ja-JP" dirty="0" smtClean="0"/>
+              <a:t>Open</a:t>
+            </a:r>
+            <a:r>
+              <a:rPr lang="ja-JP" altLang="en-US" dirty="0" smtClean="0"/>
+              <a:t>/</a:t>
+            </a:r>
+            <a:r>
+              <a:rPr lang="en-US" altLang="ja-JP" dirty="0" smtClean="0"/>
+              <a:t>Closed</a:t>
+            </a:r>
+            <a:endParaRPr lang="en-US" dirty="0"/>
+          </a:p>
+        </p:txBody>
+      </p:sp>
+      <p:sp>
+        <p:nvSpPr>
+          <p:cNvPr id="3" name="Content Placeholder 2"/>
+          <p:cNvSpPr>
+            <a:spLocks noGrp="1"/>
+          </p:cNvSpPr>
+          <p:nvPr>
+            <p:ph idx="1"/>
+          </p:nvPr>
+        </p:nvSpPr>
+        <p:spPr/>
+        <p:txBody>
+          <a:bodyPr>
+            <a:normAutofit fontScale="92500"/>
+          </a:bodyPr>
+          <a:lstStyle/>
+          <a:p>
+            <a:r>
+              <a:rPr lang="en-US" altLang="ja-JP" dirty="0" smtClean="0"/>
+              <a:t>Open</a:t>
+            </a:r>
+            <a:r>
+              <a:rPr lang="ja-JP" altLang="en-US" dirty="0" smtClean="0"/>
+              <a:t> </a:t>
+            </a:r>
+            <a:r>
+              <a:rPr lang="ja-JP" altLang="ja-JP" dirty="0" smtClean="0"/>
+              <a:t>f</a:t>
+            </a:r>
+            <a:r>
+              <a:rPr lang="en-US" altLang="ja-JP" dirty="0" smtClean="0"/>
+              <a:t>or</a:t>
+            </a:r>
+            <a:r>
+              <a:rPr lang="ja-JP" altLang="en-US" dirty="0" smtClean="0"/>
+              <a:t> </a:t>
+            </a:r>
+            <a:r>
+              <a:rPr lang="en-US" altLang="ja-JP" dirty="0" smtClean="0"/>
+              <a:t>extension</a:t>
+            </a:r>
+            <a:r>
+              <a:rPr lang="ja-JP" altLang="en-US" dirty="0" smtClean="0"/>
+              <a:t> </a:t>
+            </a:r>
+            <a:r>
+              <a:rPr lang="en-US" altLang="ja-JP" dirty="0" smtClean="0"/>
+              <a:t>but</a:t>
+            </a:r>
+            <a:r>
+              <a:rPr lang="ja-JP" altLang="en-US" dirty="0" smtClean="0"/>
+              <a:t> </a:t>
+            </a:r>
+            <a:r>
+              <a:rPr lang="en-US" altLang="ja-JP" dirty="0" smtClean="0"/>
+              <a:t>closed</a:t>
+            </a:r>
+            <a:r>
+              <a:rPr lang="ja-JP" altLang="en-US" dirty="0" smtClean="0"/>
+              <a:t> </a:t>
+            </a:r>
+            <a:r>
+              <a:rPr lang="en-US" altLang="ja-JP" dirty="0" smtClean="0"/>
+              <a:t>for</a:t>
+            </a:r>
+            <a:r>
+              <a:rPr lang="ja-JP" altLang="en-US" dirty="0" smtClean="0"/>
+              <a:t> </a:t>
+            </a:r>
+            <a:r>
+              <a:rPr lang="en-US" altLang="ja-JP" dirty="0" smtClean="0"/>
+              <a:t>modification.</a:t>
+            </a:r>
+          </a:p>
+          <a:p>
+            <a:endParaRPr lang="en-US" dirty="0"/>
+          </a:p>
+          <a:p>
+            <a:r>
+              <a:rPr lang="en-US" altLang="ja-JP" dirty="0" smtClean="0"/>
+              <a:t>Removes</a:t>
+            </a:r>
+            <a:r>
+              <a:rPr lang="ja-JP" altLang="en-US" dirty="0"/>
+              <a:t> </a:t>
+            </a:r>
+            <a:r>
+              <a:rPr lang="en-US" altLang="ja-JP" dirty="0" smtClean="0"/>
+              <a:t>dependency</a:t>
+            </a:r>
+            <a:r>
+              <a:rPr lang="ja-JP" altLang="en-US" dirty="0" smtClean="0"/>
+              <a:t> </a:t>
+            </a:r>
+            <a:r>
+              <a:rPr lang="en-US" altLang="ja-JP" dirty="0" smtClean="0"/>
+              <a:t>on</a:t>
+            </a:r>
+            <a:r>
+              <a:rPr lang="ja-JP" altLang="en-US" dirty="0" smtClean="0"/>
+              <a:t> </a:t>
+            </a:r>
+            <a:r>
+              <a:rPr lang="en-US" altLang="ja-JP" dirty="0" smtClean="0"/>
+              <a:t>types/variables.</a:t>
+            </a:r>
+            <a:r>
+              <a:rPr lang="ja-JP" altLang="en-US" dirty="0" smtClean="0"/>
+              <a:t> </a:t>
+            </a:r>
+            <a:r>
+              <a:rPr lang="en-US" altLang="ja-JP" dirty="0" smtClean="0"/>
+              <a:t>Shapes</a:t>
+            </a:r>
+            <a:r>
+              <a:rPr lang="ja-JP" altLang="en-US" dirty="0" smtClean="0"/>
+              <a:t> </a:t>
+            </a:r>
+            <a:r>
+              <a:rPr lang="en-US" altLang="ja-JP" dirty="0" smtClean="0"/>
+              <a:t>example</a:t>
+            </a:r>
+            <a:r>
+              <a:rPr lang="ja-JP" altLang="en-US" dirty="0" smtClean="0"/>
+              <a:t> </a:t>
+            </a:r>
+            <a:r>
+              <a:rPr lang="en-US" altLang="ja-JP" dirty="0" smtClean="0"/>
+              <a:t>and</a:t>
+            </a:r>
+            <a:r>
+              <a:rPr lang="ja-JP" altLang="en-US" dirty="0" smtClean="0"/>
+              <a:t> </a:t>
+            </a:r>
+            <a:r>
+              <a:rPr lang="en-US" altLang="ja-JP" dirty="0" smtClean="0"/>
+              <a:t>abstract</a:t>
+            </a:r>
+            <a:r>
+              <a:rPr lang="ja-JP" altLang="en-US" dirty="0" smtClean="0"/>
+              <a:t> </a:t>
+            </a:r>
+            <a:r>
+              <a:rPr lang="en-US" altLang="ja-JP" dirty="0" smtClean="0"/>
+              <a:t>methods.</a:t>
+            </a:r>
+            <a:r>
+              <a:rPr lang="ja-JP" altLang="en-US" dirty="0" smtClean="0"/>
+              <a:t> </a:t>
+            </a:r>
+            <a:endParaRPr lang="en-US" altLang="ja-JP" dirty="0" smtClean="0"/>
+          </a:p>
+          <a:p>
+            <a:endParaRPr lang="en-US" altLang="ja-JP" dirty="0" smtClean="0"/>
+          </a:p>
+          <a:p>
+            <a:r>
+              <a:rPr lang="ja-JP" altLang="ja-JP" dirty="0" smtClean="0"/>
+              <a:t>A</a:t>
+            </a:r>
+            <a:r>
+              <a:rPr lang="en-US" altLang="ja-JP" dirty="0" smtClean="0"/>
+              <a:t>voids</a:t>
+            </a:r>
+            <a:r>
+              <a:rPr lang="ja-JP" altLang="en-US" dirty="0" smtClean="0"/>
+              <a:t> </a:t>
+            </a:r>
+            <a:r>
+              <a:rPr lang="en-US" altLang="ja-JP" dirty="0" smtClean="0"/>
+              <a:t>needing</a:t>
+            </a:r>
+            <a:r>
+              <a:rPr lang="ja-JP" altLang="en-US" dirty="0" smtClean="0"/>
+              <a:t> </a:t>
+            </a:r>
+            <a:r>
+              <a:rPr lang="en-US" altLang="ja-JP" dirty="0" smtClean="0"/>
+              <a:t>to</a:t>
+            </a:r>
+            <a:r>
+              <a:rPr lang="ja-JP" altLang="en-US" dirty="0" smtClean="0"/>
+              <a:t> </a:t>
+            </a:r>
+            <a:r>
+              <a:rPr lang="en-US" altLang="ja-JP" dirty="0" smtClean="0"/>
+              <a:t>understand</a:t>
+            </a:r>
+            <a:r>
+              <a:rPr lang="ja-JP" altLang="en-US" dirty="0" smtClean="0"/>
+              <a:t> </a:t>
+            </a:r>
+            <a:r>
+              <a:rPr lang="en-US" altLang="ja-JP" dirty="0" smtClean="0"/>
+              <a:t>high-level</a:t>
+            </a:r>
+            <a:r>
+              <a:rPr lang="ja-JP" altLang="en-US" dirty="0" smtClean="0"/>
+              <a:t> </a:t>
+            </a:r>
+            <a:r>
+              <a:rPr lang="en-US" altLang="ja-JP" dirty="0" smtClean="0"/>
+              <a:t>code</a:t>
+            </a:r>
+            <a:r>
+              <a:rPr lang="ja-JP" altLang="en-US" dirty="0" smtClean="0"/>
+              <a:t> </a:t>
+            </a:r>
+            <a:r>
+              <a:rPr lang="en-US" altLang="ja-JP" dirty="0" smtClean="0"/>
+              <a:t>and</a:t>
+            </a:r>
+            <a:r>
+              <a:rPr lang="ja-JP" altLang="en-US" dirty="0" smtClean="0"/>
+              <a:t> </a:t>
+            </a:r>
+            <a:r>
+              <a:rPr lang="ja-JP" altLang="ja-JP" dirty="0" smtClean="0"/>
+              <a:t>t</a:t>
+            </a:r>
+            <a:r>
+              <a:rPr lang="en-US" altLang="ja-JP" dirty="0" smtClean="0"/>
+              <a:t>he</a:t>
+            </a:r>
+            <a:r>
+              <a:rPr lang="ja-JP" altLang="en-US" dirty="0" smtClean="0"/>
+              <a:t> </a:t>
+            </a:r>
+            <a:r>
+              <a:rPr lang="en-US" altLang="ja-JP" dirty="0" smtClean="0"/>
+              <a:t>program</a:t>
+            </a:r>
+            <a:r>
+              <a:rPr lang="ja-JP" altLang="en-US" dirty="0" smtClean="0"/>
+              <a:t> </a:t>
+            </a:r>
+            <a:r>
+              <a:rPr lang="en-US" altLang="ja-JP" dirty="0" smtClean="0"/>
+              <a:t>can</a:t>
+            </a:r>
+            <a:r>
+              <a:rPr lang="ja-JP" altLang="en-US" dirty="0" smtClean="0"/>
+              <a:t> </a:t>
+            </a:r>
+            <a:r>
+              <a:rPr lang="en-US" altLang="ja-JP" dirty="0" smtClean="0"/>
+              <a:t>be</a:t>
+            </a:r>
+            <a:r>
+              <a:rPr lang="ja-JP" altLang="en-US" dirty="0" smtClean="0"/>
+              <a:t> </a:t>
+            </a:r>
+            <a:r>
+              <a:rPr lang="en-US" altLang="ja-JP" dirty="0" smtClean="0"/>
+              <a:t>extended</a:t>
+            </a:r>
+            <a:r>
+              <a:rPr lang="ja-JP" altLang="en-US" dirty="0" smtClean="0"/>
+              <a:t> </a:t>
+            </a:r>
+            <a:r>
+              <a:rPr lang="en-US" altLang="ja-JP" dirty="0" smtClean="0"/>
+              <a:t>with</a:t>
+            </a:r>
+            <a:r>
+              <a:rPr lang="ja-JP" altLang="en-US" dirty="0" smtClean="0"/>
+              <a:t> </a:t>
+            </a:r>
+            <a:r>
+              <a:rPr lang="en-US" altLang="ja-JP" dirty="0" smtClean="0"/>
+              <a:t>ease.</a:t>
+            </a:r>
+            <a:r>
+              <a:rPr lang="ja-JP" altLang="en-US" dirty="0" smtClean="0"/>
+              <a:t> </a:t>
+            </a:r>
+            <a:endParaRPr lang="en-US" altLang="ja-JP" dirty="0" smtClean="0"/>
+          </a:p>
+          <a:p>
+            <a:r>
+              <a:rPr lang="ja-JP" altLang="ja-JP" dirty="0" smtClean="0"/>
+              <a:t>S</a:t>
+            </a:r>
+            <a:r>
+              <a:rPr lang="en-US" altLang="ja-JP" dirty="0" err="1" smtClean="0"/>
+              <a:t>ee</a:t>
+            </a:r>
+            <a:r>
+              <a:rPr lang="ja-JP" altLang="en-US" dirty="0" smtClean="0"/>
+              <a:t> </a:t>
+            </a:r>
+            <a:r>
+              <a:rPr lang="en-US" altLang="ja-JP" dirty="0" smtClean="0"/>
+              <a:t>sublime</a:t>
+            </a:r>
+            <a:r>
+              <a:rPr lang="ja-JP" altLang="en-US" dirty="0" smtClean="0"/>
+              <a:t> </a:t>
+            </a:r>
+            <a:r>
+              <a:rPr lang="en-US" altLang="ja-JP" dirty="0" smtClean="0"/>
+              <a:t>Example!</a:t>
+            </a:r>
+            <a:r>
+              <a:rPr lang="ja-JP" altLang="en-US" dirty="0" smtClean="0"/>
+              <a:t> </a:t>
+            </a:r>
+            <a:endParaRPr lang="en-US" dirty="0"/>
+          </a:p>
+        </p:txBody>
+      </p:sp>
+    </p:spTree>
+    <p:extLst>
+      <p:ext uri="{BB962C8B-B14F-4D97-AF65-F5344CB8AC3E}">
+        <p14:creationId xmlns:p14="http://schemas.microsoft.com/office/powerpoint/2010/main" val="2305277939"/>
+      </p:ext>
+    </p:extLst>
+  </p:cSld>
+  <p:clrMapOvr>
+    <a:masterClrMapping/>
+  </p:clrMapOvr>
+  <p:timing>
+    <p:tnLst>
+      <p:par>
+        <p:cTn xmlns:p14="http://schemas.microsoft.com/office/powerpoint/2010/main" id="1" dur="indefinite" restart="never" nodeType="tmRoot"/>
+      </p:par>
+    </p:tnLst>
+  </p:timing>
+</p:sld>
+</file>
+
+<file path=ppt/slides/slide5.xml><?xml version="1.0" encoding="utf-8"?>
+<p:sld xmlns:a="http://schemas.openxmlformats.org/drawingml/2006/main" xmlns:r="http://schemas.openxmlformats.org/officeDocument/2006/relationships" xmlns:p="http://schemas.openxmlformats.org/presentationml/2006/main">
+  <p:cSld>
+    <p:spTree>
+      <p:nvGrpSpPr>
+        <p:cNvPr id="1" name=""/>
+        <p:cNvGrpSpPr/>
+        <p:nvPr/>
+      </p:nvGrpSpPr>
+      <p:grpSpPr>
+        <a:xfrm>
+          <a:off x="0" y="0"/>
+          <a:ext cx="0" cy="0"/>
+          <a:chOff x="0" y="0"/>
+          <a:chExt cx="0" cy="0"/>
+        </a:xfrm>
+      </p:grpSpPr>
+      <p:sp>
+        <p:nvSpPr>
+          <p:cNvPr id="2" name="Title 1"/>
+          <p:cNvSpPr>
+            <a:spLocks noGrp="1"/>
+          </p:cNvSpPr>
+          <p:nvPr>
+            <p:ph type="title"/>
+          </p:nvPr>
+        </p:nvSpPr>
+        <p:spPr/>
+        <p:txBody>
+          <a:bodyPr/>
+          <a:lstStyle/>
+          <a:p>
+            <a:r>
+              <a:rPr lang="ja-JP" altLang="ja-JP" dirty="0" smtClean="0"/>
+              <a:t>I</a:t>
+            </a:r>
+            <a:r>
+              <a:rPr lang="en-US" altLang="ja-JP" dirty="0" err="1" smtClean="0"/>
+              <a:t>nterface</a:t>
+            </a:r>
+            <a:r>
+              <a:rPr lang="ja-JP" altLang="en-US" dirty="0" smtClean="0"/>
+              <a:t> </a:t>
+            </a:r>
+            <a:r>
+              <a:rPr lang="en-US" altLang="ja-JP" dirty="0" smtClean="0"/>
+              <a:t>segregation</a:t>
+            </a:r>
+            <a:endParaRPr lang="en-US" dirty="0"/>
+          </a:p>
+        </p:txBody>
+      </p:sp>
+      <p:sp>
+        <p:nvSpPr>
+          <p:cNvPr id="3" name="Content Placeholder 2"/>
+          <p:cNvSpPr>
+            <a:spLocks noGrp="1"/>
+          </p:cNvSpPr>
+          <p:nvPr>
+            <p:ph idx="1"/>
+          </p:nvPr>
+        </p:nvSpPr>
+        <p:spPr/>
+        <p:txBody>
+          <a:bodyPr/>
+          <a:lstStyle/>
+          <a:p>
+            <a:r>
+              <a:rPr lang="en-US" altLang="ja-JP" dirty="0" smtClean="0"/>
+              <a:t>Clients should not be forced to depend on interfaces they not use.</a:t>
+            </a:r>
+            <a:endParaRPr lang="en-US" dirty="0"/>
+          </a:p>
+          <a:p>
+            <a:r>
+              <a:rPr lang="en-US" dirty="0" smtClean="0"/>
+              <a:t>No fat interfaces! With fat interfaces clients may be forced to implement behavior that are unnecessary. </a:t>
+            </a:r>
+            <a:endParaRPr lang="en-US" dirty="0"/>
+          </a:p>
+          <a:p>
+            <a:r>
+              <a:rPr lang="en-US" dirty="0" smtClean="0"/>
+              <a:t>Instead of one fat interface it’s better to have many small interfaces.</a:t>
+            </a:r>
+          </a:p>
+          <a:p>
+            <a:pPr marL="0" indent="0">
+              <a:buNone/>
+            </a:pPr>
+            <a:endParaRPr lang="en-US" dirty="0"/>
+          </a:p>
+          <a:p>
+            <a:pPr marL="0" indent="0">
+              <a:buNone/>
+            </a:pPr>
+            <a:endParaRPr lang="en-US" dirty="0" smtClean="0"/>
+          </a:p>
+          <a:p>
+            <a:pPr marL="0" indent="0">
+              <a:buNone/>
+            </a:pPr>
+            <a:endParaRPr lang="en-US" dirty="0" smtClean="0"/>
+          </a:p>
+          <a:p>
+            <a:pPr marL="0" indent="0">
+              <a:buNone/>
+            </a:pPr>
+            <a:endParaRPr lang="en-US" dirty="0"/>
+          </a:p>
+        </p:txBody>
+      </p:sp>
+    </p:spTree>
+    <p:extLst>
+      <p:ext uri="{BB962C8B-B14F-4D97-AF65-F5344CB8AC3E}">
+        <p14:creationId xmlns:p14="http://schemas.microsoft.com/office/powerpoint/2010/main" val="2186933893"/>
+      </p:ext>
+    </p:extLst>
+  </p:cSld>
+  <p:clrMapOvr>
+    <a:masterClrMapping/>
+  </p:clrMapOvr>
+  <p:timing>
+    <p:tnLst>
+      <p:par>
+        <p:cTn xmlns:p14="http://schemas.microsoft.com/office/powerpoint/2010/main" id="1" dur="indefinite" restart="never" nodeType="tmRoot"/>
+      </p:par>
+    </p:tnLst>
+  </p:timing>
+</p:sld>
+</file>
+
+<file path=ppt/slides/slide6.xml><?xml version="1.0" encoding="utf-8"?>
+<p:sld xmlns:a="http://schemas.openxmlformats.org/drawingml/2006/main" xmlns:r="http://schemas.openxmlformats.org/officeDocument/2006/relationships" xmlns:p="http://schemas.openxmlformats.org/presentationml/2006/main">
+  <p:cSld>
+    <p:spTree>
+      <p:nvGrpSpPr>
+        <p:cNvPr id="1" name=""/>
+        <p:cNvGrpSpPr/>
+        <p:nvPr/>
+      </p:nvGrpSpPr>
+      <p:grpSpPr>
+        <a:xfrm>
+          <a:off x="0" y="0"/>
+          <a:ext cx="0" cy="0"/>
+          <a:chOff x="0" y="0"/>
+          <a:chExt cx="0" cy="0"/>
+        </a:xfrm>
+      </p:grpSpPr>
+      <p:sp>
+        <p:nvSpPr>
+          <p:cNvPr id="2" name="Title 1"/>
+          <p:cNvSpPr>
+            <a:spLocks noGrp="1"/>
+          </p:cNvSpPr>
+          <p:nvPr>
+            <p:ph type="title"/>
+          </p:nvPr>
+        </p:nvSpPr>
+        <p:spPr/>
+        <p:txBody>
+          <a:bodyPr/>
+          <a:lstStyle/>
+          <a:p>
+            <a:r>
+              <a:rPr lang="en-US" altLang="ja-JP" dirty="0" smtClean="0"/>
+              <a:t>Example</a:t>
+            </a:r>
+            <a:r>
+              <a:rPr lang="ja-JP" altLang="en-US" dirty="0" smtClean="0"/>
+              <a:t> </a:t>
+            </a:r>
+            <a:r>
+              <a:rPr lang="en-US" altLang="ja-JP" dirty="0" smtClean="0"/>
+              <a:t>of</a:t>
+            </a:r>
+            <a:r>
+              <a:rPr lang="ja-JP" altLang="en-US" dirty="0" smtClean="0"/>
+              <a:t> </a:t>
+            </a:r>
+            <a:r>
+              <a:rPr lang="en-US" altLang="ja-JP" dirty="0" smtClean="0"/>
+              <a:t>fat</a:t>
+            </a:r>
+            <a:r>
+              <a:rPr lang="ja-JP" altLang="en-US" dirty="0" smtClean="0"/>
+              <a:t> </a:t>
+            </a:r>
+            <a:r>
+              <a:rPr lang="en-US" altLang="ja-JP" dirty="0" smtClean="0"/>
+              <a:t>interface!</a:t>
+            </a:r>
+            <a:endParaRPr lang="en-US" dirty="0"/>
+          </a:p>
+        </p:txBody>
+      </p:sp>
+      <p:sp>
+        <p:nvSpPr>
+          <p:cNvPr id="3" name="Content Placeholder 2"/>
+          <p:cNvSpPr>
+            <a:spLocks noGrp="1"/>
+          </p:cNvSpPr>
+          <p:nvPr>
+            <p:ph idx="1"/>
+          </p:nvPr>
+        </p:nvSpPr>
+        <p:spPr/>
+        <p:txBody>
+          <a:bodyPr>
+            <a:normAutofit lnSpcReduction="10000"/>
+          </a:bodyPr>
+          <a:lstStyle/>
+          <a:p>
+            <a:pPr marL="0" indent="0">
+              <a:spcBef>
+                <a:spcPts val="0"/>
+              </a:spcBef>
+              <a:buNone/>
+            </a:pPr>
+            <a:r>
+              <a:rPr lang="en-US" altLang="ja-JP" sz="2000" dirty="0" smtClean="0"/>
+              <a:t>Interface</a:t>
+            </a:r>
+            <a:r>
+              <a:rPr lang="ja-JP" altLang="en-US" sz="2000" dirty="0" smtClean="0"/>
+              <a:t> </a:t>
+            </a:r>
+            <a:r>
+              <a:rPr lang="ja-JP" altLang="ja-JP" sz="2000" dirty="0" smtClean="0"/>
+              <a:t>I</a:t>
+            </a:r>
+            <a:r>
+              <a:rPr lang="en-US" altLang="ja-JP" sz="2000" dirty="0"/>
+              <a:t>W</a:t>
+            </a:r>
+            <a:r>
+              <a:rPr lang="en-US" altLang="ja-JP" sz="2000" dirty="0" smtClean="0"/>
+              <a:t>orker</a:t>
+            </a:r>
+            <a:r>
+              <a:rPr lang="ja-JP" altLang="en-US" sz="2000" dirty="0" smtClean="0"/>
+              <a:t> </a:t>
+            </a:r>
+            <a:r>
+              <a:rPr lang="en-US" altLang="ja-JP" sz="2000" dirty="0" smtClean="0"/>
+              <a:t>{</a:t>
+            </a:r>
+          </a:p>
+          <a:p>
+            <a:pPr marL="0" indent="0">
+              <a:spcBef>
+                <a:spcPts val="0"/>
+              </a:spcBef>
+              <a:buNone/>
+            </a:pPr>
+            <a:r>
+              <a:rPr lang="en-US" altLang="ja-JP" sz="2000" dirty="0" smtClean="0"/>
+              <a:t>	void work();</a:t>
+            </a:r>
+          </a:p>
+          <a:p>
+            <a:pPr marL="0" indent="0">
+              <a:spcBef>
+                <a:spcPts val="0"/>
+              </a:spcBef>
+              <a:buNone/>
+            </a:pPr>
+            <a:r>
+              <a:rPr lang="en-US" altLang="ja-JP" sz="2000" dirty="0"/>
+              <a:t>	</a:t>
+            </a:r>
+            <a:r>
+              <a:rPr lang="en-US" altLang="ja-JP" sz="2000" dirty="0" smtClean="0"/>
+              <a:t>void</a:t>
+            </a:r>
+            <a:r>
+              <a:rPr lang="ja-JP" altLang="en-US" sz="2000" dirty="0" smtClean="0"/>
+              <a:t> </a:t>
+            </a:r>
+            <a:r>
+              <a:rPr lang="en-US" altLang="ja-JP" sz="2000" dirty="0" smtClean="0"/>
+              <a:t>eat();</a:t>
+            </a:r>
+            <a:endParaRPr lang="en-US" altLang="ja-JP" sz="2000" dirty="0"/>
+          </a:p>
+          <a:p>
+            <a:pPr marL="0" indent="0">
+              <a:spcBef>
+                <a:spcPts val="0"/>
+              </a:spcBef>
+              <a:buNone/>
+            </a:pPr>
+            <a:r>
+              <a:rPr lang="en-US" altLang="ja-JP" sz="2000" dirty="0" smtClean="0"/>
+              <a:t>}</a:t>
+            </a:r>
+          </a:p>
+          <a:p>
+            <a:pPr marL="0" indent="0">
+              <a:spcBef>
+                <a:spcPts val="0"/>
+              </a:spcBef>
+              <a:buNone/>
+            </a:pPr>
+            <a:endParaRPr lang="en-US" sz="2000" dirty="0"/>
+          </a:p>
+          <a:p>
+            <a:pPr marL="0" indent="0">
+              <a:spcBef>
+                <a:spcPts val="0"/>
+              </a:spcBef>
+              <a:buNone/>
+            </a:pPr>
+            <a:r>
+              <a:rPr lang="en-US" sz="2000" dirty="0" smtClean="0"/>
+              <a:t>Class Worker Implements </a:t>
+            </a:r>
+            <a:r>
+              <a:rPr lang="en-US" sz="2000" dirty="0" err="1" smtClean="0"/>
+              <a:t>IWorker</a:t>
+            </a:r>
+            <a:r>
+              <a:rPr lang="en-US" sz="2000" dirty="0" smtClean="0"/>
+              <a:t> {</a:t>
+            </a:r>
+          </a:p>
+          <a:p>
+            <a:pPr marL="0" indent="0">
+              <a:spcBef>
+                <a:spcPts val="0"/>
+              </a:spcBef>
+              <a:buNone/>
+            </a:pPr>
+            <a:r>
+              <a:rPr lang="en-US" sz="2000" dirty="0"/>
+              <a:t>	</a:t>
+            </a:r>
+            <a:r>
+              <a:rPr lang="en-US" sz="2000" dirty="0" smtClean="0"/>
+              <a:t>public void work() { works; }</a:t>
+            </a:r>
+          </a:p>
+          <a:p>
+            <a:pPr marL="0" indent="0">
+              <a:spcBef>
+                <a:spcPts val="0"/>
+              </a:spcBef>
+              <a:buNone/>
+            </a:pPr>
+            <a:r>
+              <a:rPr lang="en-US" sz="2000" dirty="0" smtClean="0"/>
+              <a:t>	public void eat() { eats; }</a:t>
+            </a:r>
+            <a:endParaRPr lang="en-US" sz="2000" dirty="0"/>
+          </a:p>
+          <a:p>
+            <a:pPr marL="0" indent="0">
+              <a:spcBef>
+                <a:spcPts val="0"/>
+              </a:spcBef>
+              <a:buNone/>
+            </a:pPr>
+            <a:r>
+              <a:rPr lang="en-US" sz="2000" dirty="0" smtClean="0"/>
+              <a:t>}</a:t>
+            </a:r>
+          </a:p>
+          <a:p>
+            <a:pPr marL="0" indent="0">
+              <a:spcBef>
+                <a:spcPts val="0"/>
+              </a:spcBef>
+              <a:buNone/>
+            </a:pPr>
+            <a:endParaRPr lang="en-US" sz="2000" dirty="0"/>
+          </a:p>
+          <a:p>
+            <a:pPr marL="0" indent="0">
+              <a:spcBef>
+                <a:spcPts val="0"/>
+              </a:spcBef>
+              <a:buNone/>
+            </a:pPr>
+            <a:r>
+              <a:rPr lang="en-US" sz="2000" dirty="0" smtClean="0"/>
+              <a:t>Class Robot Implements </a:t>
+            </a:r>
+            <a:r>
+              <a:rPr lang="en-US" sz="2000" dirty="0" err="1" smtClean="0"/>
+              <a:t>Iworker</a:t>
+            </a:r>
+            <a:r>
+              <a:rPr lang="en-US" sz="2000" dirty="0" smtClean="0"/>
+              <a:t> {</a:t>
+            </a:r>
+          </a:p>
+          <a:p>
+            <a:pPr marL="0" indent="0">
+              <a:spcBef>
+                <a:spcPts val="0"/>
+              </a:spcBef>
+              <a:buNone/>
+            </a:pPr>
+            <a:r>
+              <a:rPr lang="en-US" sz="2000" dirty="0" smtClean="0"/>
+              <a:t>	public void() { works;}</a:t>
+            </a:r>
+          </a:p>
+          <a:p>
+            <a:pPr marL="0" indent="0">
+              <a:spcBef>
+                <a:spcPts val="0"/>
+              </a:spcBef>
+              <a:buNone/>
+            </a:pPr>
+            <a:r>
+              <a:rPr lang="en-US" sz="2000" dirty="0"/>
+              <a:t>	</a:t>
+            </a:r>
+            <a:r>
+              <a:rPr lang="en-US" sz="2000" dirty="0" smtClean="0"/>
+              <a:t>public void() { eats; } </a:t>
+            </a:r>
+            <a:r>
+              <a:rPr lang="en-US" sz="2000" dirty="0" smtClean="0">
+                <a:solidFill>
+                  <a:srgbClr val="FF0000"/>
+                </a:solidFill>
+              </a:rPr>
+              <a:t>// But robots don</a:t>
+            </a:r>
+            <a:r>
+              <a:rPr lang="fr-FR" sz="2000" dirty="0" smtClean="0">
+                <a:solidFill>
+                  <a:srgbClr val="FF0000"/>
+                </a:solidFill>
+              </a:rPr>
+              <a:t>’</a:t>
+            </a:r>
+            <a:r>
+              <a:rPr lang="en-US" sz="2000" dirty="0" smtClean="0">
+                <a:solidFill>
+                  <a:srgbClr val="FF0000"/>
+                </a:solidFill>
+              </a:rPr>
+              <a:t>t eat!</a:t>
+            </a:r>
+            <a:endParaRPr lang="en-US" sz="2000" dirty="0">
+              <a:solidFill>
+                <a:srgbClr val="FF0000"/>
+              </a:solidFill>
+            </a:endParaRPr>
+          </a:p>
+          <a:p>
+            <a:pPr marL="0" indent="0">
+              <a:spcBef>
+                <a:spcPts val="0"/>
+              </a:spcBef>
+              <a:buNone/>
+            </a:pPr>
+            <a:r>
+              <a:rPr lang="en-US" sz="2000" dirty="0" smtClean="0"/>
+              <a:t>}</a:t>
+            </a:r>
+          </a:p>
+          <a:p>
+            <a:pPr marL="0" indent="0">
+              <a:spcBef>
+                <a:spcPts val="0"/>
+              </a:spcBef>
+              <a:buNone/>
+            </a:pPr>
+            <a:r>
+              <a:rPr lang="en-US" altLang="ja-JP" sz="2000" dirty="0" smtClean="0">
+                <a:solidFill>
+                  <a:schemeClr val="accent3">
+                    <a:lumMod val="75000"/>
+                  </a:schemeClr>
+                </a:solidFill>
+              </a:rPr>
+              <a:t>So</a:t>
+            </a:r>
+            <a:r>
+              <a:rPr lang="ja-JP" altLang="en-US" sz="2000" dirty="0" smtClean="0">
+                <a:solidFill>
+                  <a:schemeClr val="accent3">
+                    <a:lumMod val="75000"/>
+                  </a:schemeClr>
+                </a:solidFill>
+              </a:rPr>
+              <a:t> </a:t>
+            </a:r>
+            <a:r>
+              <a:rPr lang="en-US" altLang="ja-JP" sz="2000" dirty="0" smtClean="0">
+                <a:solidFill>
+                  <a:schemeClr val="accent3">
+                    <a:lumMod val="75000"/>
+                  </a:schemeClr>
+                </a:solidFill>
+              </a:rPr>
+              <a:t>what</a:t>
+            </a:r>
+            <a:r>
+              <a:rPr lang="ja-JP" altLang="en-US" sz="2000" dirty="0" smtClean="0">
+                <a:solidFill>
+                  <a:schemeClr val="accent3">
+                    <a:lumMod val="75000"/>
+                  </a:schemeClr>
+                </a:solidFill>
+              </a:rPr>
+              <a:t> </a:t>
+            </a:r>
+            <a:r>
+              <a:rPr lang="en-US" altLang="ja-JP" sz="2000" dirty="0" smtClean="0">
+                <a:solidFill>
+                  <a:schemeClr val="accent3">
+                    <a:lumMod val="75000"/>
+                  </a:schemeClr>
+                </a:solidFill>
+              </a:rPr>
+              <a:t>should</a:t>
+            </a:r>
+            <a:r>
+              <a:rPr lang="ja-JP" altLang="en-US" sz="2000" dirty="0" smtClean="0">
+                <a:solidFill>
+                  <a:schemeClr val="accent3">
+                    <a:lumMod val="75000"/>
+                  </a:schemeClr>
+                </a:solidFill>
+              </a:rPr>
+              <a:t> </a:t>
+            </a:r>
+            <a:r>
+              <a:rPr lang="en-US" altLang="ja-JP" sz="2000" dirty="0" smtClean="0">
+                <a:solidFill>
+                  <a:schemeClr val="accent3">
+                    <a:lumMod val="75000"/>
+                  </a:schemeClr>
+                </a:solidFill>
+              </a:rPr>
+              <a:t>you</a:t>
+            </a:r>
+            <a:r>
+              <a:rPr lang="ja-JP" altLang="en-US" sz="2000" dirty="0" smtClean="0">
+                <a:solidFill>
+                  <a:schemeClr val="accent3">
+                    <a:lumMod val="75000"/>
+                  </a:schemeClr>
+                </a:solidFill>
+              </a:rPr>
+              <a:t> </a:t>
+            </a:r>
+            <a:r>
+              <a:rPr lang="en-US" altLang="ja-JP" sz="2000" dirty="0" smtClean="0">
+                <a:solidFill>
+                  <a:schemeClr val="accent3">
+                    <a:lumMod val="75000"/>
+                  </a:schemeClr>
+                </a:solidFill>
+              </a:rPr>
+              <a:t>do?</a:t>
+            </a:r>
+            <a:endParaRPr lang="en-US" sz="2000" dirty="0">
+              <a:solidFill>
+                <a:schemeClr val="accent3">
+                  <a:lumMod val="75000"/>
+                </a:schemeClr>
+              </a:solidFill>
+            </a:endParaRPr>
+          </a:p>
+        </p:txBody>
+      </p:sp>
+    </p:spTree>
+    <p:extLst>
+      <p:ext uri="{BB962C8B-B14F-4D97-AF65-F5344CB8AC3E}">
+        <p14:creationId xmlns:p14="http://schemas.microsoft.com/office/powerpoint/2010/main" val="2650995663"/>
+      </p:ext>
+    </p:extLst>
+  </p:cSld>
+  <p:clrMapOvr>
+    <a:masterClrMapping/>
+  </p:clrMapOvr>
+  <p:timing>
+    <p:tnLst>
+      <p:par>
+        <p:cTn xmlns:p14="http://schemas.microsoft.com/office/powerpoint/2010/main" id="1" dur="indefinite" restart="never" nodeType="tmRoot"/>
+      </p:par>
+    </p:tnLst>
+  </p:timing>
+</p:sld>
+</file>
+
+<file path=ppt/slides/slide7.xml><?xml version="1.0" encoding="utf-8"?>
+<p:sld xmlns:a="http://schemas.openxmlformats.org/drawingml/2006/main" xmlns:r="http://schemas.openxmlformats.org/officeDocument/2006/relationships" xmlns:p="http://schemas.openxmlformats.org/presentationml/2006/main">
+  <p:cSld>
+    <p:spTree>
+      <p:nvGrpSpPr>
+        <p:cNvPr id="1" name=""/>
+        <p:cNvGrpSpPr/>
+        <p:nvPr/>
+      </p:nvGrpSpPr>
+      <p:grpSpPr>
+        <a:xfrm>
+          <a:off x="0" y="0"/>
+          <a:ext cx="0" cy="0"/>
+          <a:chOff x="0" y="0"/>
+          <a:chExt cx="0" cy="0"/>
+        </a:xfrm>
+      </p:grpSpPr>
+      <p:sp>
+        <p:nvSpPr>
+          <p:cNvPr id="2" name="Title 1"/>
+          <p:cNvSpPr>
+            <a:spLocks noGrp="1"/>
+          </p:cNvSpPr>
+          <p:nvPr>
+            <p:ph type="title"/>
+          </p:nvPr>
+        </p:nvSpPr>
+        <p:spPr/>
+        <p:txBody>
+          <a:bodyPr/>
+          <a:lstStyle/>
+          <a:p>
+            <a:r>
+              <a:rPr lang="en-US" altLang="ja-JP" dirty="0" err="1" smtClean="0"/>
+              <a:t>Liskov</a:t>
+            </a:r>
+            <a:r>
+              <a:rPr lang="ja-JP" altLang="ja-JP" dirty="0" smtClean="0"/>
+              <a:t>‘</a:t>
+            </a:r>
+            <a:r>
+              <a:rPr lang="en-US" altLang="ja-JP" dirty="0" smtClean="0"/>
+              <a:t>s</a:t>
+            </a:r>
+            <a:r>
+              <a:rPr lang="ja-JP" altLang="en-US" dirty="0" smtClean="0"/>
+              <a:t> </a:t>
+            </a:r>
+            <a:r>
+              <a:rPr lang="en-US" altLang="ja-JP" dirty="0" smtClean="0"/>
+              <a:t>substitution</a:t>
+            </a:r>
+            <a:endParaRPr lang="en-US" dirty="0"/>
+          </a:p>
+        </p:txBody>
+      </p:sp>
+      <p:sp>
+        <p:nvSpPr>
+          <p:cNvPr id="3" name="Content Placeholder 2"/>
+          <p:cNvSpPr>
+            <a:spLocks noGrp="1"/>
+          </p:cNvSpPr>
+          <p:nvPr>
+            <p:ph idx="1"/>
+          </p:nvPr>
+        </p:nvSpPr>
+        <p:spPr/>
+        <p:txBody>
+          <a:bodyPr>
+            <a:normAutofit fontScale="47500" lnSpcReduction="20000"/>
+          </a:bodyPr>
+          <a:lstStyle/>
+          <a:p>
+            <a:r>
+              <a:rPr lang="en-US" altLang="ja-JP" dirty="0" smtClean="0"/>
+              <a:t>Derived</a:t>
+            </a:r>
+            <a:r>
+              <a:rPr lang="ja-JP" altLang="en-US" dirty="0" smtClean="0"/>
+              <a:t> </a:t>
+            </a:r>
+            <a:r>
+              <a:rPr lang="en-US" altLang="ja-JP" dirty="0" smtClean="0"/>
+              <a:t>classes</a:t>
+            </a:r>
+            <a:r>
+              <a:rPr lang="ja-JP" altLang="en-US" dirty="0" smtClean="0"/>
+              <a:t> </a:t>
+            </a:r>
+            <a:r>
+              <a:rPr lang="en-US" altLang="ja-JP" dirty="0" smtClean="0"/>
+              <a:t>must</a:t>
+            </a:r>
+            <a:r>
+              <a:rPr lang="ja-JP" altLang="en-US" dirty="0" smtClean="0"/>
+              <a:t> </a:t>
+            </a:r>
+            <a:r>
+              <a:rPr lang="en-US" altLang="ja-JP" dirty="0" smtClean="0"/>
+              <a:t>be</a:t>
+            </a:r>
+            <a:r>
+              <a:rPr lang="ja-JP" altLang="en-US" dirty="0" smtClean="0"/>
+              <a:t> </a:t>
+            </a:r>
+            <a:r>
+              <a:rPr lang="en-US" altLang="ja-JP" dirty="0" smtClean="0"/>
+              <a:t>completely</a:t>
+            </a:r>
+            <a:r>
+              <a:rPr lang="ja-JP" altLang="en-US" dirty="0" smtClean="0"/>
+              <a:t> </a:t>
+            </a:r>
+            <a:r>
+              <a:rPr lang="en-US" altLang="ja-JP" dirty="0" smtClean="0"/>
+              <a:t>substitution</a:t>
+            </a:r>
+            <a:r>
+              <a:rPr lang="ja-JP" altLang="en-US" dirty="0" smtClean="0"/>
+              <a:t> </a:t>
+            </a:r>
+            <a:r>
+              <a:rPr lang="en-US" altLang="ja-JP" dirty="0" smtClean="0"/>
+              <a:t>for their base classes.  Below is a violation example.</a:t>
+            </a:r>
+          </a:p>
+          <a:p>
+            <a:r>
+              <a:rPr lang="ja-JP" altLang="ja-JP" dirty="0" smtClean="0"/>
+              <a:t>N</a:t>
+            </a:r>
+            <a:r>
+              <a:rPr lang="en-US" altLang="ja-JP" dirty="0" smtClean="0"/>
+              <a:t>o</a:t>
+            </a:r>
+            <a:r>
+              <a:rPr lang="ja-JP" altLang="en-US" dirty="0" smtClean="0"/>
+              <a:t> </a:t>
+            </a:r>
+            <a:r>
+              <a:rPr lang="en-US" altLang="ja-JP" dirty="0" smtClean="0"/>
+              <a:t>redundant</a:t>
+            </a:r>
+            <a:r>
+              <a:rPr lang="ja-JP" altLang="en-US" dirty="0" smtClean="0"/>
+              <a:t> </a:t>
+            </a:r>
+            <a:r>
+              <a:rPr lang="en-US" altLang="ja-JP" dirty="0" smtClean="0"/>
+              <a:t>methods!</a:t>
+            </a:r>
+          </a:p>
+          <a:p>
+            <a:endParaRPr lang="en-US" dirty="0" smtClean="0"/>
+          </a:p>
+          <a:p>
+            <a:pPr marL="0" indent="0">
+              <a:buNone/>
+            </a:pPr>
+            <a:r>
+              <a:rPr lang="en-US" dirty="0" smtClean="0"/>
+              <a:t>Class </a:t>
+            </a:r>
+            <a:r>
+              <a:rPr lang="en-US" dirty="0" err="1" smtClean="0"/>
+              <a:t>MyCollection</a:t>
+            </a:r>
+            <a:r>
+              <a:rPr lang="en-US" dirty="0" smtClean="0"/>
+              <a:t> {</a:t>
+            </a:r>
+          </a:p>
+          <a:p>
+            <a:pPr marL="0" indent="0">
+              <a:buNone/>
+            </a:pPr>
+            <a:r>
+              <a:rPr lang="en-US" dirty="0" smtClean="0"/>
+              <a:t>	</a:t>
+            </a:r>
+            <a:r>
+              <a:rPr lang="en-US" dirty="0" err="1" smtClean="0"/>
+              <a:t>int</a:t>
+            </a:r>
+            <a:r>
+              <a:rPr lang="en-US" dirty="0" smtClean="0"/>
+              <a:t> count();</a:t>
+            </a:r>
+          </a:p>
+          <a:p>
+            <a:pPr marL="0" indent="0">
+              <a:buNone/>
+            </a:pPr>
+            <a:r>
+              <a:rPr lang="en-US" dirty="0"/>
+              <a:t>	</a:t>
+            </a:r>
+            <a:r>
+              <a:rPr lang="en-US" dirty="0" smtClean="0"/>
+              <a:t>void add();</a:t>
+            </a:r>
+            <a:endParaRPr lang="en-US" dirty="0"/>
+          </a:p>
+          <a:p>
+            <a:pPr marL="0" indent="0">
+              <a:buNone/>
+            </a:pPr>
+            <a:r>
+              <a:rPr lang="en-US" dirty="0" smtClean="0"/>
+              <a:t>}</a:t>
+            </a:r>
+          </a:p>
+          <a:p>
+            <a:pPr marL="0" indent="0">
+              <a:buNone/>
+            </a:pPr>
+            <a:endParaRPr lang="en-US" dirty="0"/>
+          </a:p>
+          <a:p>
+            <a:pPr marL="0" indent="0">
+              <a:buNone/>
+            </a:pPr>
+            <a:r>
+              <a:rPr lang="en-US" dirty="0" smtClean="0"/>
+              <a:t>Class </a:t>
+            </a:r>
+            <a:r>
+              <a:rPr lang="en-US" dirty="0" err="1" smtClean="0"/>
+              <a:t>MyArray</a:t>
+            </a:r>
+            <a:r>
+              <a:rPr lang="en-US" dirty="0" smtClean="0"/>
+              <a:t> extends </a:t>
+            </a:r>
+            <a:r>
+              <a:rPr lang="en-US" dirty="0" err="1" smtClean="0"/>
+              <a:t>MyCollection</a:t>
+            </a:r>
+            <a:r>
+              <a:rPr lang="en-US" dirty="0" smtClean="0"/>
+              <a:t>{</a:t>
+            </a:r>
+          </a:p>
+          <a:p>
+            <a:pPr marL="0" indent="0">
+              <a:buNone/>
+            </a:pPr>
+            <a:r>
+              <a:rPr lang="en-US" dirty="0" smtClean="0"/>
+              <a:t>}</a:t>
+            </a:r>
+          </a:p>
+          <a:p>
+            <a:pPr marL="0" indent="0">
+              <a:buNone/>
+            </a:pPr>
+            <a:endParaRPr lang="en-US" dirty="0"/>
+          </a:p>
+          <a:p>
+            <a:pPr marL="0" indent="0">
+              <a:buNone/>
+            </a:pPr>
+            <a:r>
+              <a:rPr lang="en-US" dirty="0" smtClean="0"/>
+              <a:t>Pubic static void main(String </a:t>
+            </a:r>
+            <a:r>
+              <a:rPr lang="en-US" dirty="0" err="1" smtClean="0"/>
+              <a:t>args</a:t>
+            </a:r>
+            <a:r>
+              <a:rPr lang="en-US" dirty="0" smtClean="0"/>
+              <a:t>[]){</a:t>
+            </a:r>
+          </a:p>
+          <a:p>
+            <a:pPr marL="0" indent="0">
+              <a:buNone/>
+            </a:pPr>
+            <a:r>
+              <a:rPr lang="en-US" dirty="0"/>
+              <a:t>	</a:t>
+            </a:r>
+            <a:r>
+              <a:rPr lang="en-US" dirty="0" err="1" smtClean="0"/>
+              <a:t>MyCollection</a:t>
+            </a:r>
+            <a:r>
+              <a:rPr lang="en-US" dirty="0" smtClean="0"/>
+              <a:t> collection= new </a:t>
+            </a:r>
+            <a:r>
+              <a:rPr lang="en-US" dirty="0" err="1" smtClean="0"/>
+              <a:t>MyArray</a:t>
+            </a:r>
+            <a:r>
+              <a:rPr lang="en-US" dirty="0" smtClean="0"/>
+              <a:t>()</a:t>
+            </a:r>
+          </a:p>
+          <a:p>
+            <a:pPr marL="0" indent="0">
+              <a:buNone/>
+            </a:pPr>
+            <a:r>
+              <a:rPr lang="en-US" dirty="0"/>
+              <a:t>	</a:t>
+            </a:r>
+            <a:r>
+              <a:rPr lang="en-US" dirty="0" err="1" smtClean="0"/>
+              <a:t>collection.add</a:t>
+            </a:r>
+            <a:r>
+              <a:rPr lang="en-US" dirty="0" smtClean="0"/>
+              <a:t>(); //This will pass but it should not as arrays have fixed sizes on initialization!</a:t>
+            </a:r>
+          </a:p>
+          <a:p>
+            <a:pPr marL="0" indent="0">
+              <a:buNone/>
+            </a:pPr>
+            <a:r>
+              <a:rPr lang="en-US" dirty="0" smtClean="0"/>
+              <a:t>}</a:t>
+            </a:r>
+          </a:p>
+          <a:p>
+            <a:pPr marL="0" indent="0">
+              <a:buNone/>
+            </a:pPr>
+            <a:endParaRPr lang="en-US" dirty="0"/>
+          </a:p>
+          <a:p>
+            <a:pPr marL="0" indent="0">
+              <a:buNone/>
+            </a:pPr>
+            <a:r>
+              <a:rPr lang="en-US" dirty="0" smtClean="0"/>
+              <a:t>If it looks like a duck and quacks like a duck but it requires batteries it probably isn’t a duck and you have the wrong abstraction!</a:t>
+            </a:r>
+            <a:endParaRPr lang="en-US" dirty="0"/>
+          </a:p>
+        </p:txBody>
+      </p:sp>
+    </p:spTree>
+    <p:extLst>
+      <p:ext uri="{BB962C8B-B14F-4D97-AF65-F5344CB8AC3E}">
+        <p14:creationId xmlns:p14="http://schemas.microsoft.com/office/powerpoint/2010/main" val="1770035149"/>
+      </p:ext>
+    </p:extLst>
+  </p:cSld>
+  <p:clrMapOvr>
+    <a:masterClrMapping/>
+  </p:clrMapOvr>
+  <p:timing>
+    <p:tnLst>
+      <p:par>
+        <p:cTn xmlns:p14="http://schemas.microsoft.com/office/powerpoint/2010/main" id="1" dur="indefinite" restart="never" nodeType="tmRoot"/>
+      </p:par>
+    </p:tnLst>
+  </p:timing>
+</p:sld>
+</file>
+
+<file path=ppt/slides/slide8.xml><?xml version="1.0" encoding="utf-8"?>
+<p:sld xmlns:a="http://schemas.openxmlformats.org/drawingml/2006/main" xmlns:r="http://schemas.openxmlformats.org/officeDocument/2006/relationships" xmlns:p="http://schemas.openxmlformats.org/presentationml/2006/main">
+  <p:cSld>
+    <p:spTree>
+      <p:nvGrpSpPr>
+        <p:cNvPr id="1" name=""/>
+        <p:cNvGrpSpPr/>
+        <p:nvPr/>
+      </p:nvGrpSpPr>
+      <p:grpSpPr>
+        <a:xfrm>
+          <a:off x="0" y="0"/>
+          <a:ext cx="0" cy="0"/>
+          <a:chOff x="0" y="0"/>
+          <a:chExt cx="0" cy="0"/>
+        </a:xfrm>
+      </p:grpSpPr>
+      <p:sp>
+        <p:nvSpPr>
+          <p:cNvPr id="2" name="Title 1"/>
+          <p:cNvSpPr>
+            <a:spLocks noGrp="1"/>
+          </p:cNvSpPr>
+          <p:nvPr>
+            <p:ph type="title"/>
+          </p:nvPr>
+        </p:nvSpPr>
+        <p:spPr/>
+        <p:txBody>
+          <a:bodyPr/>
+          <a:lstStyle/>
+          <a:p>
+            <a:r>
+              <a:rPr lang="en-US" dirty="0" smtClean="0"/>
+              <a:t>Example</a:t>
+            </a:r>
+            <a:endParaRPr lang="en-US" dirty="0"/>
+          </a:p>
+        </p:txBody>
+      </p:sp>
+      <p:sp>
+        <p:nvSpPr>
+          <p:cNvPr id="3" name="Content Placeholder 2"/>
+          <p:cNvSpPr>
+            <a:spLocks noGrp="1"/>
+          </p:cNvSpPr>
+          <p:nvPr>
+            <p:ph idx="1"/>
+          </p:nvPr>
+        </p:nvSpPr>
+        <p:spPr/>
+        <p:txBody>
+          <a:bodyPr>
+            <a:normAutofit fontScale="47500" lnSpcReduction="20000"/>
+          </a:bodyPr>
+          <a:lstStyle/>
+          <a:p>
+            <a:pPr marL="0" indent="0">
+              <a:buNone/>
+            </a:pPr>
+            <a:r>
+              <a:rPr lang="en-US" altLang="ja-JP" dirty="0" smtClean="0"/>
+              <a:t>Class</a:t>
+            </a:r>
+            <a:r>
+              <a:rPr lang="ja-JP" altLang="en-US" dirty="0" smtClean="0"/>
+              <a:t> </a:t>
+            </a:r>
+            <a:r>
+              <a:rPr lang="ja-JP" altLang="ja-JP" dirty="0" smtClean="0"/>
+              <a:t>B</a:t>
+            </a:r>
+            <a:r>
+              <a:rPr lang="en-US" altLang="ja-JP" dirty="0" err="1" smtClean="0"/>
+              <a:t>ird</a:t>
+            </a:r>
+            <a:r>
+              <a:rPr lang="en-US" altLang="ja-JP" dirty="0" smtClean="0"/>
+              <a:t>{</a:t>
+            </a:r>
+          </a:p>
+          <a:p>
+            <a:pPr marL="0" indent="0">
+              <a:buNone/>
+            </a:pPr>
+            <a:r>
+              <a:rPr lang="en-US" altLang="ja-JP" dirty="0" smtClean="0"/>
+              <a:t>	void</a:t>
+            </a:r>
+            <a:r>
+              <a:rPr lang="ja-JP" altLang="en-US" dirty="0" smtClean="0"/>
+              <a:t> </a:t>
+            </a:r>
+            <a:r>
+              <a:rPr lang="en-US" altLang="ja-JP" dirty="0" smtClean="0"/>
+              <a:t>fly();</a:t>
+            </a:r>
+            <a:endParaRPr lang="en-US" altLang="ja-JP" dirty="0"/>
+          </a:p>
+          <a:p>
+            <a:pPr marL="0" indent="0">
+              <a:buNone/>
+            </a:pPr>
+            <a:r>
+              <a:rPr lang="en-US" altLang="ja-JP" dirty="0" smtClean="0"/>
+              <a:t>}</a:t>
+            </a:r>
+          </a:p>
+          <a:p>
+            <a:pPr marL="0" indent="0">
+              <a:buNone/>
+            </a:pPr>
+            <a:r>
+              <a:rPr lang="en-US" dirty="0" smtClean="0"/>
+              <a:t>Class Pigeon extends Bird{}</a:t>
+            </a:r>
+          </a:p>
+          <a:p>
+            <a:pPr marL="0" indent="0">
+              <a:buNone/>
+            </a:pPr>
+            <a:r>
+              <a:rPr lang="en-US" dirty="0" smtClean="0"/>
+              <a:t>Class Ostrich extends Bird{}</a:t>
+            </a:r>
+          </a:p>
+          <a:p>
+            <a:pPr marL="0" indent="0">
+              <a:buNone/>
+            </a:pPr>
+            <a:endParaRPr lang="en-US" dirty="0"/>
+          </a:p>
+          <a:p>
+            <a:pPr marL="0" indent="0">
+              <a:buNone/>
+            </a:pPr>
+            <a:r>
+              <a:rPr lang="en-US" dirty="0" err="1"/>
+              <a:t>p</a:t>
+            </a:r>
+            <a:r>
+              <a:rPr lang="en-US" dirty="0" err="1" smtClean="0"/>
+              <a:t>igeon</a:t>
+            </a:r>
+            <a:r>
+              <a:rPr lang="en-US" dirty="0" err="1" smtClean="0"/>
+              <a:t>.fly</a:t>
+            </a:r>
+            <a:r>
+              <a:rPr lang="en-US" dirty="0" smtClean="0"/>
+              <a:t>()</a:t>
+            </a:r>
+          </a:p>
+          <a:p>
+            <a:pPr marL="0" indent="0">
+              <a:buNone/>
+            </a:pPr>
+            <a:r>
+              <a:rPr lang="en-US" dirty="0"/>
+              <a:t>o</a:t>
+            </a:r>
+            <a:r>
+              <a:rPr lang="en-US" dirty="0" smtClean="0"/>
+              <a:t>strich.fly() </a:t>
+            </a:r>
+            <a:r>
+              <a:rPr lang="en-US" dirty="0" smtClean="0">
+                <a:solidFill>
+                  <a:schemeClr val="accent2"/>
+                </a:solidFill>
+              </a:rPr>
+              <a:t>//Should not!! </a:t>
+            </a:r>
+          </a:p>
+          <a:p>
+            <a:pPr marL="0" indent="0">
+              <a:buNone/>
+            </a:pPr>
+            <a:endParaRPr lang="en-US" dirty="0"/>
+          </a:p>
+          <a:p>
+            <a:pPr marL="0" indent="0">
+              <a:buNone/>
+            </a:pPr>
+            <a:r>
+              <a:rPr lang="en-US" sz="4200" dirty="0" smtClean="0">
+                <a:solidFill>
+                  <a:srgbClr val="008000"/>
+                </a:solidFill>
+              </a:rPr>
+              <a:t>Solution? Abstraction!</a:t>
+            </a:r>
+          </a:p>
+          <a:p>
+            <a:pPr marL="0" indent="0">
+              <a:buNone/>
+            </a:pPr>
+            <a:r>
+              <a:rPr lang="en-US" dirty="0" smtClean="0"/>
+              <a:t>Class Bird { eats()}</a:t>
+            </a:r>
+          </a:p>
+          <a:p>
+            <a:pPr marL="0" indent="0">
+              <a:buNone/>
+            </a:pPr>
+            <a:endParaRPr lang="en-US" dirty="0" smtClean="0"/>
+          </a:p>
+          <a:p>
+            <a:pPr marL="0" indent="0">
+              <a:buNone/>
+            </a:pPr>
+            <a:r>
+              <a:rPr lang="en-US" dirty="0" smtClean="0"/>
+              <a:t>Class </a:t>
+            </a:r>
+            <a:r>
+              <a:rPr lang="en-US" dirty="0" err="1" smtClean="0"/>
+              <a:t>FlightBird</a:t>
+            </a:r>
+            <a:r>
+              <a:rPr lang="en-US" dirty="0" smtClean="0"/>
+              <a:t> extends bird { </a:t>
+            </a:r>
+          </a:p>
+          <a:p>
+            <a:pPr marL="0" indent="0">
+              <a:buNone/>
+            </a:pPr>
+            <a:r>
+              <a:rPr lang="en-US" dirty="0" smtClean="0"/>
+              <a:t>	eats();</a:t>
+            </a:r>
+          </a:p>
+          <a:p>
+            <a:pPr marL="0" indent="0">
+              <a:buNone/>
+            </a:pPr>
+            <a:r>
+              <a:rPr lang="en-US" dirty="0" smtClean="0"/>
+              <a:t>	fly();</a:t>
+            </a:r>
+          </a:p>
+          <a:p>
+            <a:pPr marL="0" indent="0">
+              <a:buNone/>
+            </a:pPr>
+            <a:r>
+              <a:rPr lang="en-US" dirty="0" smtClean="0"/>
+              <a:t>}</a:t>
+            </a:r>
+          </a:p>
+          <a:p>
+            <a:pPr marL="0" indent="0">
+              <a:buNone/>
+            </a:pPr>
+            <a:r>
+              <a:rPr lang="en-US" dirty="0" smtClean="0"/>
+              <a:t>Class </a:t>
+            </a:r>
+            <a:r>
+              <a:rPr lang="en-US" dirty="0" err="1" smtClean="0"/>
+              <a:t>NonFlightBird</a:t>
+            </a:r>
+            <a:r>
+              <a:rPr lang="en-US" dirty="0" smtClean="0"/>
+              <a:t> extends Bird {</a:t>
+            </a:r>
+          </a:p>
+          <a:p>
+            <a:pPr marL="0" indent="0">
+              <a:buNone/>
+            </a:pPr>
+            <a:r>
+              <a:rPr lang="en-US" dirty="0" smtClean="0"/>
+              <a:t>	eats();</a:t>
+            </a:r>
+          </a:p>
+          <a:p>
+            <a:pPr marL="0" indent="0">
+              <a:buNone/>
+            </a:pPr>
+            <a:r>
+              <a:rPr lang="en-US" dirty="0" smtClean="0"/>
+              <a:t>}</a:t>
+            </a:r>
+          </a:p>
+          <a:p>
+            <a:pPr marL="0" indent="0">
+              <a:buNone/>
+            </a:pPr>
+            <a:endParaRPr lang="en-US" dirty="0"/>
+          </a:p>
+        </p:txBody>
+      </p:sp>
+    </p:spTree>
+    <p:extLst>
+      <p:ext uri="{BB962C8B-B14F-4D97-AF65-F5344CB8AC3E}">
+        <p14:creationId xmlns:p14="http://schemas.microsoft.com/office/powerpoint/2010/main" val="1376888548"/>
+      </p:ext>
+    </p:extLst>
+  </p:cSld>
+  <p:clrMapOvr>
+    <a:masterClrMapping/>
+  </p:clrMapOvr>
+  <p:timing>
+    <p:tnLst>
+      <p:par>
+        <p:cTn xmlns:p14="http://schemas.microsoft.com/office/powerpoint/2010/main" id="1" dur="indefinite" restart="never" nodeType="tmRoot"/>
+      </p:par>
+    </p:tnLst>
+  </p:timing>
+</p:sld>
+</file>
+
+<file path=ppt/slides/slide9.xml><?xml version="1.0" encoding="utf-8"?>
+<p:sld xmlns:a="http://schemas.openxmlformats.org/drawingml/2006/main" xmlns:r="http://schemas.openxmlformats.org/officeDocument/2006/relationships" xmlns:p="http://schemas.openxmlformats.org/presentationml/2006/main">
+  <p:cSld>
+    <p:spTree>
+      <p:nvGrpSpPr>
+        <p:cNvPr id="1" name=""/>
+        <p:cNvGrpSpPr/>
+        <p:nvPr/>
+      </p:nvGrpSpPr>
+      <p:grpSpPr>
+        <a:xfrm>
+          <a:off x="0" y="0"/>
+          <a:ext cx="0" cy="0"/>
+          <a:chOff x="0" y="0"/>
+          <a:chExt cx="0" cy="0"/>
+        </a:xfrm>
+      </p:grpSpPr>
+      <p:sp>
+        <p:nvSpPr>
+          <p:cNvPr id="2" name="Title 1"/>
+          <p:cNvSpPr>
+            <a:spLocks noGrp="1"/>
+          </p:cNvSpPr>
+          <p:nvPr>
+            <p:ph type="title"/>
+          </p:nvPr>
+        </p:nvSpPr>
+        <p:spPr/>
+        <p:txBody>
+          <a:bodyPr/>
+          <a:lstStyle/>
+          <a:p>
+            <a:r>
+              <a:rPr lang="en-US" altLang="ja-JP" dirty="0" smtClean="0"/>
+              <a:t>Dependency</a:t>
+            </a:r>
+            <a:r>
+              <a:rPr lang="ja-JP" altLang="en-US" dirty="0" smtClean="0"/>
+              <a:t> </a:t>
+            </a:r>
+            <a:r>
+              <a:rPr lang="ja-JP" altLang="ja-JP" dirty="0" smtClean="0"/>
+              <a:t>I</a:t>
+            </a:r>
+            <a:r>
+              <a:rPr lang="en-US" altLang="ja-JP" dirty="0" err="1" smtClean="0"/>
+              <a:t>nversion</a:t>
+            </a:r>
+            <a:endParaRPr lang="en-US" dirty="0"/>
+          </a:p>
+        </p:txBody>
+      </p:sp>
+      <p:sp>
+        <p:nvSpPr>
+          <p:cNvPr id="3" name="Content Placeholder 2"/>
+          <p:cNvSpPr>
+            <a:spLocks noGrp="1"/>
+          </p:cNvSpPr>
+          <p:nvPr>
+            <p:ph idx="1"/>
+          </p:nvPr>
+        </p:nvSpPr>
+        <p:spPr/>
+        <p:txBody>
+          <a:bodyPr>
+            <a:normAutofit fontScale="62500" lnSpcReduction="20000"/>
+          </a:bodyPr>
+          <a:lstStyle/>
+          <a:p>
+            <a:endParaRPr lang="en-US" altLang="ja-JP" dirty="0" smtClean="0"/>
+          </a:p>
+          <a:p>
+            <a:r>
+              <a:rPr lang="en-US" altLang="ja-JP" dirty="0" smtClean="0"/>
+              <a:t>High level modules should not depend on low level modules. Instead it should be dependent on abstraction</a:t>
+            </a:r>
+            <a:endParaRPr lang="en-US" altLang="ja-JP" dirty="0"/>
+          </a:p>
+          <a:p>
+            <a:endParaRPr lang="en-US" altLang="ja-JP" dirty="0" smtClean="0"/>
+          </a:p>
+          <a:p>
+            <a:r>
+              <a:rPr lang="en-US" altLang="ja-JP" dirty="0" smtClean="0"/>
+              <a:t>By adding a layer of abstraction we can ensures flexibility of code.</a:t>
+            </a:r>
+          </a:p>
+          <a:p>
+            <a:endParaRPr lang="en-US" altLang="ja-JP" dirty="0" smtClean="0"/>
+          </a:p>
+          <a:p>
+            <a:r>
+              <a:rPr lang="en-US" altLang="ja-JP" dirty="0" err="1" smtClean="0"/>
+              <a:t>E.g</a:t>
+            </a:r>
+            <a:r>
+              <a:rPr lang="en-US" altLang="ja-JP" dirty="0" smtClean="0"/>
+              <a:t> </a:t>
+            </a:r>
+            <a:r>
+              <a:rPr lang="en-US" altLang="ja-JP" dirty="0" err="1" smtClean="0"/>
+              <a:t>ZooManager</a:t>
+            </a:r>
+            <a:r>
+              <a:rPr lang="en-US" altLang="ja-JP" dirty="0" smtClean="0"/>
+              <a:t>–</a:t>
+            </a:r>
+            <a:r>
+              <a:rPr lang="en-US" altLang="ja-JP" dirty="0" err="1" smtClean="0"/>
+              <a:t>Highlevel</a:t>
+            </a:r>
+            <a:r>
+              <a:rPr lang="en-US" altLang="ja-JP" dirty="0"/>
+              <a:t>,</a:t>
+            </a:r>
+            <a:r>
+              <a:rPr lang="en-US" altLang="ja-JP" dirty="0" smtClean="0"/>
+              <a:t> </a:t>
+            </a:r>
+            <a:r>
+              <a:rPr lang="en-US" altLang="ja-JP" dirty="0" err="1" smtClean="0"/>
+              <a:t>Tiger.class</a:t>
+            </a:r>
+            <a:r>
+              <a:rPr lang="en-US" altLang="ja-JP" dirty="0" smtClean="0"/>
+              <a:t> - </a:t>
+            </a:r>
+            <a:r>
+              <a:rPr lang="en-US" altLang="ja-JP" dirty="0" err="1" smtClean="0"/>
+              <a:t>Lowleval</a:t>
+            </a:r>
+            <a:r>
+              <a:rPr lang="en-US" altLang="ja-JP" dirty="0" smtClean="0"/>
+              <a:t>. </a:t>
+            </a:r>
+          </a:p>
+          <a:p>
+            <a:r>
+              <a:rPr lang="en-US" altLang="ja-JP" dirty="0" smtClean="0"/>
+              <a:t>Instead of using the concrete class of Tiger if we passed in the interface, ‘</a:t>
+            </a:r>
+            <a:r>
+              <a:rPr lang="en-US" altLang="ja-JP" dirty="0" err="1" smtClean="0"/>
+              <a:t>IMammel</a:t>
+            </a:r>
+            <a:r>
+              <a:rPr lang="en-US" altLang="ja-JP" dirty="0" smtClean="0"/>
+              <a:t>’ in the future if I wanted to add a new animal, say </a:t>
+            </a:r>
+            <a:r>
+              <a:rPr lang="en-US" altLang="ja-JP" dirty="0" err="1" smtClean="0"/>
+              <a:t>Kangaroo.class</a:t>
+            </a:r>
+            <a:r>
+              <a:rPr lang="en-US" altLang="ja-JP" dirty="0" smtClean="0"/>
+              <a:t> and make it extend I I can just create the class and pass one through as </a:t>
+            </a:r>
+            <a:r>
+              <a:rPr lang="en-US" altLang="ja-JP" dirty="0" err="1" smtClean="0"/>
+              <a:t>ZooManager</a:t>
+            </a:r>
+            <a:r>
+              <a:rPr lang="en-US" altLang="ja-JP" dirty="0" smtClean="0"/>
+              <a:t> class implements </a:t>
+            </a:r>
+            <a:r>
+              <a:rPr lang="en-US" altLang="ja-JP" dirty="0" smtClean="0"/>
+              <a:t>‘</a:t>
+            </a:r>
+            <a:r>
+              <a:rPr lang="en-US" altLang="ja-JP" dirty="0" err="1" smtClean="0"/>
+              <a:t>IMammel</a:t>
+            </a:r>
+            <a:r>
+              <a:rPr lang="en-US" altLang="ja-JP" dirty="0" smtClean="0"/>
+              <a:t>’</a:t>
+            </a:r>
+            <a:r>
+              <a:rPr lang="en-US" altLang="ja-JP" dirty="0" smtClean="0"/>
+              <a:t> any class that implements this interface </a:t>
+            </a:r>
+            <a:r>
+              <a:rPr lang="en-US" altLang="ja-JP" dirty="0" smtClean="0"/>
+              <a:t>can be passed through without </a:t>
+            </a:r>
+            <a:r>
+              <a:rPr lang="en-US" altLang="ja-JP" dirty="0" err="1" smtClean="0"/>
+              <a:t>ZooManager</a:t>
+            </a:r>
+            <a:r>
+              <a:rPr lang="en-US" altLang="ja-JP" dirty="0" smtClean="0"/>
+              <a:t> ever being touched.</a:t>
+            </a:r>
+            <a:r>
+              <a:rPr lang="en-US" altLang="ja-JP" dirty="0" smtClean="0"/>
+              <a:t> </a:t>
+            </a:r>
+            <a:r>
+              <a:rPr lang="en-US" altLang="ja-JP" dirty="0" smtClean="0"/>
+              <a:t> </a:t>
+            </a:r>
+          </a:p>
+          <a:p>
+            <a:endParaRPr lang="en-US" altLang="ja-JP" dirty="0" smtClean="0"/>
+          </a:p>
+          <a:p>
+            <a:r>
+              <a:rPr lang="en-US" altLang="ja-JP" dirty="0" smtClean="0"/>
+              <a:t>High level classed are not working directly with </a:t>
+            </a:r>
+            <a:r>
+              <a:rPr lang="en-US" altLang="ja-JP" dirty="0" err="1" smtClean="0"/>
+              <a:t>lowlevel</a:t>
+            </a:r>
+            <a:r>
+              <a:rPr lang="en-US" altLang="ja-JP" dirty="0" smtClean="0"/>
+              <a:t> classed and instead the interfaces!</a:t>
+            </a:r>
+          </a:p>
+          <a:p>
+            <a:endParaRPr lang="en-US" altLang="ja-JP" dirty="0" smtClean="0"/>
+          </a:p>
+        </p:txBody>
+      </p:sp>
+    </p:spTree>
+    <p:extLst>
+      <p:ext uri="{BB962C8B-B14F-4D97-AF65-F5344CB8AC3E}">
+        <p14:creationId xmlns:p14="http://schemas.microsoft.com/office/powerpoint/2010/main" val="1623322763"/>
+      </p:ext>
+    </p:extLst>
+  </p:cSld>
+  <p:clrMapOvr>
+    <a:masterClrMapping/>
+  </p:clrMapOvr>
+  <p:timing>
+    <p:tnLst>
+      <p:par>
+        <p:cTn xmlns:p14="http://schemas.microsoft.com/office/powerpoint/2010/main" id="1" dur="indefinite" restart="never" nodeType="tmRoot"/>
+      </p:par>
+    </p:tnLst>
+  </p:timing>
 </p:sld>
 </file>
 

</xml_diff>